<commit_message>
Added Lesson 3 and Lesson 4
</commit_message>
<xml_diff>
--- a/PPT/OpenGLTutorial_2.pptx
+++ b/PPT/OpenGLTutorial_2.pptx
@@ -5,7 +5,7 @@
     <p:sldMasterId id="2147483648" r:id="rId1"/>
   </p:sldMasterIdLst>
   <p:notesMasterIdLst>
-    <p:notesMasterId r:id="rId14"/>
+    <p:notesMasterId r:id="rId20"/>
   </p:notesMasterIdLst>
   <p:sldIdLst>
     <p:sldId id="349" r:id="rId2"/>
@@ -14,12 +14,18 @@
     <p:sldId id="355" r:id="rId5"/>
     <p:sldId id="356" r:id="rId6"/>
     <p:sldId id="357" r:id="rId7"/>
-    <p:sldId id="361" r:id="rId8"/>
+    <p:sldId id="367" r:id="rId8"/>
     <p:sldId id="359" r:id="rId9"/>
-    <p:sldId id="360" r:id="rId10"/>
-    <p:sldId id="358" r:id="rId11"/>
-    <p:sldId id="362" r:id="rId12"/>
-    <p:sldId id="348" r:id="rId13"/>
+    <p:sldId id="361" r:id="rId10"/>
+    <p:sldId id="360" r:id="rId11"/>
+    <p:sldId id="358" r:id="rId12"/>
+    <p:sldId id="362" r:id="rId13"/>
+    <p:sldId id="364" r:id="rId14"/>
+    <p:sldId id="365" r:id="rId15"/>
+    <p:sldId id="366" r:id="rId16"/>
+    <p:sldId id="368" r:id="rId17"/>
+    <p:sldId id="369" r:id="rId18"/>
+    <p:sldId id="348" r:id="rId19"/>
   </p:sldIdLst>
   <p:sldSz cx="9144000" cy="5143500" type="screen16x9"/>
   <p:notesSz cx="6858000" cy="9144000"/>
@@ -323,7 +329,7 @@
               <a:pPr>
                 <a:defRPr/>
               </a:pPr>
-              <a:t>2018/1/7</a:t>
+              <a:t>2018/1/28</a:t>
             </a:fld>
             <a:endParaRPr lang="zh-CN" altLang="en-US" sz="1200"/>
           </a:p>
@@ -961,7 +967,7 @@
               <a:pPr>
                 <a:defRPr/>
               </a:pPr>
-              <a:t>2018/1/7</a:t>
+              <a:t>2018/1/30</a:t>
             </a:fld>
             <a:endParaRPr lang="zh-CN" altLang="en-US" sz="1200"/>
           </a:p>
@@ -990,7 +996,7 @@
               <a:pPr>
                 <a:defRPr/>
               </a:pPr>
-              <a:t>12</a:t>
+              <a:t>18</a:t>
             </a:fld>
             <a:endParaRPr lang="zh-CN" altLang="en-US" sz="1200"/>
           </a:p>
@@ -3466,7 +3472,7 @@
           <p:cNvPr id="2" name="Title 1">
             <a:extLst>
               <a:ext uri="{FF2B5EF4-FFF2-40B4-BE49-F238E27FC236}">
-                <a16:creationId xmlns:a16="http://schemas.microsoft.com/office/drawing/2014/main" id="{49EE2DB2-72C1-4BBC-BBE0-27995F5F0141}"/>
+                <a16:creationId xmlns:a16="http://schemas.microsoft.com/office/drawing/2014/main" id="{2D46B329-CC71-459B-A194-34FDBFB7D38B}"/>
               </a:ext>
             </a:extLst>
           </p:cNvPr>
@@ -3484,7 +3490,7 @@
           <a:p>
             <a:r>
               <a:rPr lang="en-US" dirty="0"/>
-              <a:t>Matrix Functions</a:t>
+              <a:t>Matrix Functions (Projection)</a:t>
             </a:r>
           </a:p>
         </p:txBody>
@@ -3494,7 +3500,7 @@
           <p:cNvPr id="3" name="Content Placeholder 2">
             <a:extLst>
               <a:ext uri="{FF2B5EF4-FFF2-40B4-BE49-F238E27FC236}">
-                <a16:creationId xmlns:a16="http://schemas.microsoft.com/office/drawing/2014/main" id="{F7801C44-81AF-4877-A294-487D83C82A85}"/>
+                <a16:creationId xmlns:a16="http://schemas.microsoft.com/office/drawing/2014/main" id="{3D1A8384-2727-40CF-9350-232AEF9AE78C}"/>
               </a:ext>
             </a:extLst>
           </p:cNvPr>
@@ -3512,30 +3518,44 @@
           <a:p>
             <a:r>
               <a:rPr lang="en-US" dirty="0" err="1"/>
-              <a:t>Matrix.multiplyMM</a:t>
-            </a:r>
-            <a:endParaRPr lang="en-US" dirty="0"/>
+              <a:t>Matrix.frustrumM</a:t>
+            </a:r>
+            <a:r>
+              <a:rPr lang="en-US" dirty="0"/>
+              <a:t> (</a:t>
+            </a:r>
+            <a:r>
+              <a:rPr lang="zh-CN" altLang="en-US" dirty="0"/>
+              <a:t>透视投影</a:t>
+            </a:r>
+            <a:r>
+              <a:rPr lang="en-US" dirty="0"/>
+              <a:t>)</a:t>
+            </a:r>
+          </a:p>
+          <a:p>
+            <a:r>
+              <a:rPr lang="en-US" dirty="0" err="1"/>
+              <a:t>Matrix.orthM</a:t>
+            </a:r>
+            <a:r>
+              <a:rPr lang="en-US" dirty="0"/>
+              <a:t> (</a:t>
+            </a:r>
+            <a:r>
+              <a:rPr lang="zh-CN" altLang="en-US" dirty="0"/>
+              <a:t>正交投影</a:t>
+            </a:r>
+            <a:r>
+              <a:rPr lang="en-US" dirty="0"/>
+              <a:t>)</a:t>
+            </a:r>
           </a:p>
           <a:p>
             <a:pPr lvl="1"/>
             <a:r>
               <a:rPr lang="en-US" dirty="0" err="1"/>
-              <a:t>Projected_vertex</a:t>
-            </a:r>
-            <a:r>
-              <a:rPr lang="en-US" dirty="0"/>
-              <a:t> = P*V*M*</a:t>
-            </a:r>
-            <a:r>
-              <a:rPr lang="en-US" dirty="0" err="1"/>
-              <a:t>local_vertex</a:t>
-            </a:r>
-            <a:endParaRPr lang="en-US" dirty="0"/>
-          </a:p>
-          <a:p>
-            <a:r>
-              <a:rPr lang="en-US" dirty="0" err="1"/>
-              <a:t>Matrix.multiplyMV</a:t>
+              <a:t>Left,right,bottom,top,near,far</a:t>
             </a:r>
             <a:endParaRPr lang="en-US" dirty="0"/>
           </a:p>
@@ -3544,7 +3564,7 @@
     </p:spTree>
     <p:extLst>
       <p:ext uri="{BB962C8B-B14F-4D97-AF65-F5344CB8AC3E}">
-        <p14:creationId xmlns:p14="http://schemas.microsoft.com/office/powerpoint/2010/main" val="2484121090"/>
+        <p14:creationId xmlns:p14="http://schemas.microsoft.com/office/powerpoint/2010/main" val="1592753841"/>
       </p:ext>
     </p:extLst>
   </p:cSld>
@@ -3576,7 +3596,7 @@
           <p:cNvPr id="2" name="Title 1">
             <a:extLst>
               <a:ext uri="{FF2B5EF4-FFF2-40B4-BE49-F238E27FC236}">
-                <a16:creationId xmlns:a16="http://schemas.microsoft.com/office/drawing/2014/main" id="{2FE5139E-C840-48A8-9854-7BFD87E0257E}"/>
+                <a16:creationId xmlns:a16="http://schemas.microsoft.com/office/drawing/2014/main" id="{49EE2DB2-72C1-4BBC-BBE0-27995F5F0141}"/>
               </a:ext>
             </a:extLst>
           </p:cNvPr>
@@ -3593,10 +3613,9 @@
           <a:lstStyle/>
           <a:p>
             <a:r>
-              <a:rPr lang="en-US" dirty="0" err="1"/>
-              <a:t>Shaders</a:t>
-            </a:r>
-            <a:endParaRPr lang="en-US" dirty="0"/>
+              <a:rPr lang="en-US" dirty="0"/>
+              <a:t>Matrix Functions</a:t>
+            </a:r>
           </a:p>
         </p:txBody>
       </p:sp>
@@ -3605,7 +3624,7 @@
           <p:cNvPr id="3" name="Content Placeholder 2">
             <a:extLst>
               <a:ext uri="{FF2B5EF4-FFF2-40B4-BE49-F238E27FC236}">
-                <a16:creationId xmlns:a16="http://schemas.microsoft.com/office/drawing/2014/main" id="{D84DFEAD-477D-42DD-83E6-A649A47ACDC5}"/>
+                <a16:creationId xmlns:a16="http://schemas.microsoft.com/office/drawing/2014/main" id="{F7801C44-81AF-4877-A294-487D83C82A85}"/>
               </a:ext>
             </a:extLst>
           </p:cNvPr>
@@ -3621,14 +3640,41 @@
           <a:bodyPr/>
           <a:lstStyle/>
           <a:p>
-            <a:endParaRPr lang="en-US"/>
+            <a:r>
+              <a:rPr lang="en-US" dirty="0" err="1"/>
+              <a:t>Matrix.multiplyMM</a:t>
+            </a:r>
+            <a:endParaRPr lang="en-US" dirty="0"/>
+          </a:p>
+          <a:p>
+            <a:pPr lvl="1"/>
+            <a:r>
+              <a:rPr lang="en-US" dirty="0" err="1"/>
+              <a:t>Projected_vertex</a:t>
+            </a:r>
+            <a:r>
+              <a:rPr lang="en-US" dirty="0"/>
+              <a:t> = P*V*M*</a:t>
+            </a:r>
+            <a:r>
+              <a:rPr lang="en-US" dirty="0" err="1"/>
+              <a:t>local_vertex</a:t>
+            </a:r>
+            <a:endParaRPr lang="en-US" dirty="0"/>
+          </a:p>
+          <a:p>
+            <a:r>
+              <a:rPr lang="en-US" dirty="0" err="1"/>
+              <a:t>Matrix.multiplyMV</a:t>
+            </a:r>
+            <a:endParaRPr lang="en-US" dirty="0"/>
           </a:p>
         </p:txBody>
       </p:sp>
     </p:spTree>
     <p:extLst>
       <p:ext uri="{BB962C8B-B14F-4D97-AF65-F5344CB8AC3E}">
-        <p14:creationId xmlns:p14="http://schemas.microsoft.com/office/powerpoint/2010/main" val="90974381"/>
+        <p14:creationId xmlns:p14="http://schemas.microsoft.com/office/powerpoint/2010/main" val="2484121090"/>
       </p:ext>
     </p:extLst>
   </p:cSld>
@@ -3660,6 +3706,1772 @@
           <p:cNvPr id="2" name="Title 1">
             <a:extLst>
               <a:ext uri="{FF2B5EF4-FFF2-40B4-BE49-F238E27FC236}">
+                <a16:creationId xmlns:a16="http://schemas.microsoft.com/office/drawing/2014/main" id="{2FE5139E-C840-48A8-9854-7BFD87E0257E}"/>
+              </a:ext>
+            </a:extLst>
+          </p:cNvPr>
+          <p:cNvSpPr>
+            <a:spLocks noGrp="1"/>
+          </p:cNvSpPr>
+          <p:nvPr>
+            <p:ph type="title"/>
+          </p:nvPr>
+        </p:nvSpPr>
+        <p:spPr/>
+        <p:txBody>
+          <a:bodyPr/>
+          <a:lstStyle/>
+          <a:p>
+            <a:r>
+              <a:rPr lang="en-US" dirty="0" err="1"/>
+              <a:t>Shader</a:t>
+            </a:r>
+            <a:r>
+              <a:rPr lang="en-US" dirty="0"/>
+              <a:t> </a:t>
+            </a:r>
+            <a:r>
+              <a:rPr lang="zh-CN" altLang="en-US" dirty="0"/>
+              <a:t>初窥</a:t>
+            </a:r>
+            <a:endParaRPr lang="en-US" dirty="0"/>
+          </a:p>
+        </p:txBody>
+      </p:sp>
+      <p:sp>
+        <p:nvSpPr>
+          <p:cNvPr id="3" name="Content Placeholder 2">
+            <a:extLst>
+              <a:ext uri="{FF2B5EF4-FFF2-40B4-BE49-F238E27FC236}">
+                <a16:creationId xmlns:a16="http://schemas.microsoft.com/office/drawing/2014/main" id="{D84DFEAD-477D-42DD-83E6-A649A47ACDC5}"/>
+              </a:ext>
+            </a:extLst>
+          </p:cNvPr>
+          <p:cNvSpPr>
+            <a:spLocks noGrp="1"/>
+          </p:cNvSpPr>
+          <p:nvPr>
+            <p:ph idx="1"/>
+          </p:nvPr>
+        </p:nvSpPr>
+        <p:spPr/>
+        <p:txBody>
+          <a:bodyPr/>
+          <a:lstStyle/>
+          <a:p>
+            <a:r>
+              <a:rPr lang="zh-CN" altLang="en-US" dirty="0"/>
+              <a:t>最简单的</a:t>
+            </a:r>
+            <a:r>
+              <a:rPr lang="en-US" dirty="0"/>
+              <a:t>Vertex </a:t>
+            </a:r>
+            <a:r>
+              <a:rPr lang="en-US" dirty="0" err="1"/>
+              <a:t>Shader</a:t>
+            </a:r>
+            <a:endParaRPr lang="en-US" dirty="0"/>
+          </a:p>
+          <a:p>
+            <a:endParaRPr lang="en-US" dirty="0"/>
+          </a:p>
+          <a:p>
+            <a:endParaRPr lang="en-US" dirty="0"/>
+          </a:p>
+          <a:p>
+            <a:endParaRPr lang="en-US" dirty="0"/>
+          </a:p>
+          <a:p>
+            <a:r>
+              <a:rPr lang="zh-CN" altLang="en-US" dirty="0"/>
+              <a:t>最简单的</a:t>
+            </a:r>
+            <a:r>
+              <a:rPr lang="en-US" altLang="zh-CN" dirty="0"/>
+              <a:t>Fragment </a:t>
+            </a:r>
+            <a:r>
+              <a:rPr lang="en-US" altLang="zh-CN" dirty="0" err="1"/>
+              <a:t>Shader</a:t>
+            </a:r>
+            <a:endParaRPr lang="en-US" dirty="0"/>
+          </a:p>
+          <a:p>
+            <a:pPr marL="0" indent="0">
+              <a:buNone/>
+            </a:pPr>
+            <a:endParaRPr lang="en-US" dirty="0"/>
+          </a:p>
+        </p:txBody>
+      </p:sp>
+      <p:sp>
+        <p:nvSpPr>
+          <p:cNvPr id="5" name="Rectangle 2">
+            <a:extLst>
+              <a:ext uri="{FF2B5EF4-FFF2-40B4-BE49-F238E27FC236}">
+                <a16:creationId xmlns:a16="http://schemas.microsoft.com/office/drawing/2014/main" id="{BC94FEE6-2E79-48E7-B95F-161AF07D892A}"/>
+              </a:ext>
+            </a:extLst>
+          </p:cNvPr>
+          <p:cNvSpPr>
+            <a:spLocks noChangeArrowheads="1"/>
+          </p:cNvSpPr>
+          <p:nvPr/>
+        </p:nvSpPr>
+        <p:spPr bwMode="auto">
+          <a:xfrm>
+            <a:off x="762000" y="1657350"/>
+            <a:ext cx="3837910" cy="1107996"/>
+          </a:xfrm>
+          <a:prstGeom prst="rect">
+            <a:avLst/>
+          </a:prstGeom>
+          <a:solidFill>
+            <a:srgbClr val="FFFFFF"/>
+          </a:solidFill>
+          <a:ln>
+            <a:noFill/>
+          </a:ln>
+          <a:effectLst/>
+          <a:extLst>
+            <a:ext uri="{91240B29-F687-4F45-9708-019B960494DF}">
+              <a14:hiddenLine xmlns:a14="http://schemas.microsoft.com/office/drawing/2010/main" w="9525">
+                <a:solidFill>
+                  <a:schemeClr val="tx1"/>
+                </a:solidFill>
+                <a:miter lim="800000"/>
+                <a:headEnd/>
+                <a:tailEnd/>
+              </a14:hiddenLine>
+            </a:ext>
+            <a:ext uri="{AF507438-7753-43E0-B8FC-AC1667EBCBE1}">
+              <a14:hiddenEffects xmlns:a14="http://schemas.microsoft.com/office/drawing/2010/main">
+                <a:effectLst>
+                  <a:outerShdw dist="35921" dir="2700000" algn="ctr" rotWithShape="0">
+                    <a:schemeClr val="bg2"/>
+                  </a:outerShdw>
+                </a:effectLst>
+              </a14:hiddenEffects>
+            </a:ext>
+          </a:extLst>
+        </p:spPr>
+        <p:txBody>
+          <a:bodyPr vert="horz" wrap="none" lIns="91440" tIns="45720" rIns="91440" bIns="45720" numCol="1" anchor="ctr" anchorCtr="0" compatLnSpc="1">
+            <a:prstTxWarp prst="textNoShape">
+              <a:avLst/>
+            </a:prstTxWarp>
+            <a:spAutoFit/>
+          </a:bodyPr>
+          <a:lstStyle/>
+          <a:p>
+            <a:pPr marL="0" marR="0" lvl="0" indent="0" algn="l" defTabSz="914400" rtl="0" eaLnBrk="0" fontAlgn="base" latinLnBrk="0" hangingPunct="0">
+              <a:lnSpc>
+                <a:spcPct val="100000"/>
+              </a:lnSpc>
+              <a:spcBef>
+                <a:spcPct val="0"/>
+              </a:spcBef>
+              <a:spcAft>
+                <a:spcPct val="0"/>
+              </a:spcAft>
+              <a:buClrTx/>
+              <a:buSzTx/>
+              <a:buFontTx/>
+              <a:buNone/>
+              <a:tabLst/>
+            </a:pPr>
+            <a:r>
+              <a:rPr lang="en-US" altLang="en-US" sz="1100" b="1" dirty="0">
+                <a:solidFill>
+                  <a:srgbClr val="008000"/>
+                </a:solidFill>
+                <a:latin typeface="Courier New" panose="02070309020205020404" pitchFamily="49" charset="0"/>
+                <a:cs typeface="Courier New" panose="02070309020205020404" pitchFamily="49" charset="0"/>
+              </a:rPr>
+              <a:t>precision </a:t>
+            </a:r>
+            <a:r>
+              <a:rPr lang="en-US" altLang="en-US" sz="1100" b="1" dirty="0" err="1">
+                <a:solidFill>
+                  <a:srgbClr val="008000"/>
+                </a:solidFill>
+                <a:latin typeface="Courier New" panose="02070309020205020404" pitchFamily="49" charset="0"/>
+                <a:cs typeface="Courier New" panose="02070309020205020404" pitchFamily="49" charset="0"/>
+              </a:rPr>
+              <a:t>mediump</a:t>
+            </a:r>
+            <a:r>
+              <a:rPr lang="en-US" altLang="en-US" sz="1100" b="1" dirty="0">
+                <a:solidFill>
+                  <a:srgbClr val="008000"/>
+                </a:solidFill>
+                <a:latin typeface="Courier New" panose="02070309020205020404" pitchFamily="49" charset="0"/>
+                <a:cs typeface="Courier New" panose="02070309020205020404" pitchFamily="49" charset="0"/>
+              </a:rPr>
+              <a:t> float;</a:t>
+            </a:r>
+            <a:endParaRPr kumimoji="0" lang="en-US" altLang="en-US" sz="1100" b="1" i="0" u="none" strike="noStrike" cap="none" normalizeH="0" baseline="0" dirty="0">
+              <a:ln>
+                <a:noFill/>
+              </a:ln>
+              <a:solidFill>
+                <a:srgbClr val="008000"/>
+              </a:solidFill>
+              <a:effectLst/>
+              <a:latin typeface="Courier New" panose="02070309020205020404" pitchFamily="49" charset="0"/>
+              <a:cs typeface="Courier New" panose="02070309020205020404" pitchFamily="49" charset="0"/>
+            </a:endParaRPr>
+          </a:p>
+          <a:p>
+            <a:pPr marL="0" marR="0" lvl="0" indent="0" algn="l" defTabSz="914400" rtl="0" eaLnBrk="0" fontAlgn="base" latinLnBrk="0" hangingPunct="0">
+              <a:lnSpc>
+                <a:spcPct val="100000"/>
+              </a:lnSpc>
+              <a:spcBef>
+                <a:spcPct val="0"/>
+              </a:spcBef>
+              <a:spcAft>
+                <a:spcPct val="0"/>
+              </a:spcAft>
+              <a:buClrTx/>
+              <a:buSzTx/>
+              <a:buFontTx/>
+              <a:buNone/>
+              <a:tabLst/>
+            </a:pPr>
+            <a:r>
+              <a:rPr kumimoji="0" lang="en-US" altLang="en-US" sz="1100" b="1" i="0" u="none" strike="noStrike" cap="none" normalizeH="0" baseline="0" dirty="0">
+                <a:ln>
+                  <a:noFill/>
+                </a:ln>
+                <a:solidFill>
+                  <a:schemeClr val="accent1">
+                    <a:lumMod val="75000"/>
+                  </a:schemeClr>
+                </a:solidFill>
+                <a:effectLst/>
+                <a:latin typeface="Courier New" panose="02070309020205020404" pitchFamily="49" charset="0"/>
+                <a:cs typeface="Courier New" panose="02070309020205020404" pitchFamily="49" charset="0"/>
+              </a:rPr>
+              <a:t>uniform</a:t>
+            </a:r>
+            <a:r>
+              <a:rPr kumimoji="0" lang="en-US" altLang="en-US" sz="1100" b="1" i="0" u="none" strike="noStrike" cap="none" normalizeH="0" baseline="0" dirty="0">
+                <a:ln>
+                  <a:noFill/>
+                </a:ln>
+                <a:solidFill>
+                  <a:srgbClr val="008000"/>
+                </a:solidFill>
+                <a:effectLst/>
+                <a:latin typeface="Courier New" panose="02070309020205020404" pitchFamily="49" charset="0"/>
+                <a:cs typeface="Courier New" panose="02070309020205020404" pitchFamily="49" charset="0"/>
+              </a:rPr>
+              <a:t> </a:t>
+            </a:r>
+            <a:r>
+              <a:rPr kumimoji="0" lang="en-US" altLang="en-US" sz="1100" b="1" i="0" u="none" strike="noStrike" cap="none" normalizeH="0" baseline="0" dirty="0">
+                <a:ln>
+                  <a:noFill/>
+                </a:ln>
+                <a:solidFill>
+                  <a:srgbClr val="CC00FF"/>
+                </a:solidFill>
+                <a:effectLst/>
+                <a:latin typeface="Courier New" panose="02070309020205020404" pitchFamily="49" charset="0"/>
+                <a:cs typeface="Courier New" panose="02070309020205020404" pitchFamily="49" charset="0"/>
+              </a:rPr>
+              <a:t>mat4</a:t>
+            </a:r>
+            <a:r>
+              <a:rPr kumimoji="0" lang="en-US" altLang="en-US" sz="1100" b="1" i="0" u="none" strike="noStrike" cap="none" normalizeH="0" baseline="0" dirty="0">
+                <a:ln>
+                  <a:noFill/>
+                </a:ln>
+                <a:solidFill>
+                  <a:srgbClr val="008000"/>
+                </a:solidFill>
+                <a:effectLst/>
+                <a:latin typeface="Courier New" panose="02070309020205020404" pitchFamily="49" charset="0"/>
+                <a:cs typeface="Courier New" panose="02070309020205020404" pitchFamily="49" charset="0"/>
+              </a:rPr>
+              <a:t> </a:t>
+            </a:r>
+            <a:r>
+              <a:rPr kumimoji="0" lang="en-US" altLang="en-US" sz="1100" b="1" i="0" u="none" strike="noStrike" cap="none" normalizeH="0" baseline="0" dirty="0" err="1">
+                <a:ln>
+                  <a:noFill/>
+                </a:ln>
+                <a:solidFill>
+                  <a:srgbClr val="008000"/>
+                </a:solidFill>
+                <a:effectLst/>
+                <a:latin typeface="Courier New" panose="02070309020205020404" pitchFamily="49" charset="0"/>
+                <a:cs typeface="Courier New" panose="02070309020205020404" pitchFamily="49" charset="0"/>
+              </a:rPr>
+              <a:t>u_MVPMatrix</a:t>
+            </a:r>
+            <a:r>
+              <a:rPr kumimoji="0" lang="en-US" altLang="en-US" sz="1100" b="1" i="0" u="none" strike="noStrike" cap="none" normalizeH="0" baseline="0" dirty="0">
+                <a:ln>
+                  <a:noFill/>
+                </a:ln>
+                <a:solidFill>
+                  <a:srgbClr val="008000"/>
+                </a:solidFill>
+                <a:effectLst/>
+                <a:latin typeface="Courier New" panose="02070309020205020404" pitchFamily="49" charset="0"/>
+                <a:cs typeface="Courier New" panose="02070309020205020404" pitchFamily="49" charset="0"/>
+              </a:rPr>
+              <a:t>;</a:t>
+            </a:r>
+            <a:br>
+              <a:rPr kumimoji="0" lang="en-US" altLang="en-US" sz="1100" b="0" i="1" u="none" strike="noStrike" cap="none" normalizeH="0" baseline="0" dirty="0">
+                <a:ln>
+                  <a:noFill/>
+                </a:ln>
+                <a:solidFill>
+                  <a:srgbClr val="808080"/>
+                </a:solidFill>
+                <a:effectLst/>
+                <a:latin typeface="Courier New" panose="02070309020205020404" pitchFamily="49" charset="0"/>
+                <a:cs typeface="Courier New" panose="02070309020205020404" pitchFamily="49" charset="0"/>
+              </a:rPr>
+            </a:br>
+            <a:r>
+              <a:rPr kumimoji="0" lang="en-US" altLang="en-US" sz="1100" b="1" i="0" u="none" strike="noStrike" cap="none" normalizeH="0" baseline="0" dirty="0">
+                <a:ln>
+                  <a:noFill/>
+                </a:ln>
+                <a:solidFill>
+                  <a:schemeClr val="accent1">
+                    <a:lumMod val="75000"/>
+                  </a:schemeClr>
+                </a:solidFill>
+                <a:effectLst/>
+                <a:latin typeface="Courier New" panose="02070309020205020404" pitchFamily="49" charset="0"/>
+                <a:cs typeface="Courier New" panose="02070309020205020404" pitchFamily="49" charset="0"/>
+              </a:rPr>
+              <a:t>attribute</a:t>
+            </a:r>
+            <a:r>
+              <a:rPr kumimoji="0" lang="en-US" altLang="en-US" sz="1100" b="1" i="0" u="none" strike="noStrike" cap="none" normalizeH="0" baseline="0" dirty="0">
+                <a:ln>
+                  <a:noFill/>
+                </a:ln>
+                <a:solidFill>
+                  <a:srgbClr val="008000"/>
+                </a:solidFill>
+                <a:effectLst/>
+                <a:latin typeface="Courier New" panose="02070309020205020404" pitchFamily="49" charset="0"/>
+                <a:cs typeface="Courier New" panose="02070309020205020404" pitchFamily="49" charset="0"/>
+              </a:rPr>
+              <a:t> </a:t>
+            </a:r>
+            <a:r>
+              <a:rPr kumimoji="0" lang="en-US" altLang="en-US" sz="1100" b="1" i="0" u="none" strike="noStrike" cap="none" normalizeH="0" baseline="0" dirty="0">
+                <a:ln>
+                  <a:noFill/>
+                </a:ln>
+                <a:solidFill>
+                  <a:srgbClr val="CC00FF"/>
+                </a:solidFill>
+                <a:effectLst/>
+                <a:latin typeface="Courier New" panose="02070309020205020404" pitchFamily="49" charset="0"/>
+                <a:cs typeface="Courier New" panose="02070309020205020404" pitchFamily="49" charset="0"/>
+              </a:rPr>
+              <a:t>vec4</a:t>
+            </a:r>
+            <a:r>
+              <a:rPr kumimoji="0" lang="en-US" altLang="en-US" sz="1100" b="1" i="0" u="none" strike="noStrike" cap="none" normalizeH="0" baseline="0" dirty="0">
+                <a:ln>
+                  <a:noFill/>
+                </a:ln>
+                <a:solidFill>
+                  <a:srgbClr val="008000"/>
+                </a:solidFill>
+                <a:effectLst/>
+                <a:latin typeface="Courier New" panose="02070309020205020404" pitchFamily="49" charset="0"/>
+                <a:cs typeface="Courier New" panose="02070309020205020404" pitchFamily="49" charset="0"/>
+              </a:rPr>
+              <a:t> </a:t>
+            </a:r>
+            <a:r>
+              <a:rPr kumimoji="0" lang="en-US" altLang="en-US" sz="1100" b="1" i="0" u="none" strike="noStrike" cap="none" normalizeH="0" baseline="0" dirty="0" err="1">
+                <a:ln>
+                  <a:noFill/>
+                </a:ln>
+                <a:solidFill>
+                  <a:srgbClr val="008000"/>
+                </a:solidFill>
+                <a:effectLst/>
+                <a:latin typeface="Courier New" panose="02070309020205020404" pitchFamily="49" charset="0"/>
+                <a:cs typeface="Courier New" panose="02070309020205020404" pitchFamily="49" charset="0"/>
+              </a:rPr>
+              <a:t>a_Position</a:t>
+            </a:r>
+            <a:r>
+              <a:rPr kumimoji="0" lang="en-US" altLang="en-US" sz="1100" b="1" i="0" u="none" strike="noStrike" cap="none" normalizeH="0" baseline="0" dirty="0">
+                <a:ln>
+                  <a:noFill/>
+                </a:ln>
+                <a:solidFill>
+                  <a:srgbClr val="008000"/>
+                </a:solidFill>
+                <a:effectLst/>
+                <a:latin typeface="Courier New" panose="02070309020205020404" pitchFamily="49" charset="0"/>
+                <a:cs typeface="Courier New" panose="02070309020205020404" pitchFamily="49" charset="0"/>
+              </a:rPr>
+              <a:t>;</a:t>
+            </a:r>
+          </a:p>
+          <a:p>
+            <a:pPr marL="0" marR="0" lvl="0" indent="0" algn="l" defTabSz="914400" rtl="0" eaLnBrk="0" fontAlgn="base" latinLnBrk="0" hangingPunct="0">
+              <a:lnSpc>
+                <a:spcPct val="100000"/>
+              </a:lnSpc>
+              <a:spcBef>
+                <a:spcPct val="0"/>
+              </a:spcBef>
+              <a:spcAft>
+                <a:spcPct val="0"/>
+              </a:spcAft>
+              <a:buClrTx/>
+              <a:buSzTx/>
+              <a:buFontTx/>
+              <a:buNone/>
+              <a:tabLst/>
+            </a:pPr>
+            <a:r>
+              <a:rPr kumimoji="0" lang="en-US" altLang="en-US" sz="1100" b="1" i="0" u="none" strike="noStrike" cap="none" normalizeH="0" baseline="0" dirty="0">
+                <a:ln>
+                  <a:noFill/>
+                </a:ln>
+                <a:solidFill>
+                  <a:srgbClr val="008000"/>
+                </a:solidFill>
+                <a:effectLst/>
+                <a:latin typeface="Courier New" panose="02070309020205020404" pitchFamily="49" charset="0"/>
+                <a:cs typeface="Courier New" panose="02070309020205020404" pitchFamily="49" charset="0"/>
+              </a:rPr>
+              <a:t>void </a:t>
+            </a:r>
+            <a:r>
+              <a:rPr kumimoji="0" lang="en-US" altLang="en-US" sz="1100" b="1" i="0" u="none" strike="noStrike" cap="none" normalizeH="0" baseline="0" dirty="0">
+                <a:ln>
+                  <a:noFill/>
+                </a:ln>
+                <a:solidFill>
+                  <a:srgbClr val="7030A0"/>
+                </a:solidFill>
+                <a:effectLst/>
+                <a:latin typeface="Courier New" panose="02070309020205020404" pitchFamily="49" charset="0"/>
+                <a:cs typeface="Courier New" panose="02070309020205020404" pitchFamily="49" charset="0"/>
+              </a:rPr>
+              <a:t>main</a:t>
+            </a:r>
+            <a:r>
+              <a:rPr kumimoji="0" lang="en-US" altLang="en-US" sz="1100" b="1" i="0" u="none" strike="noStrike" cap="none" normalizeH="0" baseline="0" dirty="0">
+                <a:ln>
+                  <a:noFill/>
+                </a:ln>
+                <a:solidFill>
+                  <a:srgbClr val="008000"/>
+                </a:solidFill>
+                <a:effectLst/>
+                <a:latin typeface="Courier New" panose="02070309020205020404" pitchFamily="49" charset="0"/>
+                <a:cs typeface="Courier New" panose="02070309020205020404" pitchFamily="49" charset="0"/>
+              </a:rPr>
+              <a:t>(){</a:t>
+            </a:r>
+            <a:br>
+              <a:rPr kumimoji="0" lang="en-US" altLang="en-US" sz="1100" b="0" i="1" u="none" strike="noStrike" cap="none" normalizeH="0" baseline="0" dirty="0">
+                <a:ln>
+                  <a:noFill/>
+                </a:ln>
+                <a:solidFill>
+                  <a:srgbClr val="808080"/>
+                </a:solidFill>
+                <a:effectLst/>
+                <a:latin typeface="Courier New" panose="02070309020205020404" pitchFamily="49" charset="0"/>
+                <a:cs typeface="Courier New" panose="02070309020205020404" pitchFamily="49" charset="0"/>
+              </a:rPr>
+            </a:br>
+            <a:r>
+              <a:rPr kumimoji="0" lang="en-US" altLang="en-US" sz="1100" b="0" i="1" u="none" strike="noStrike" cap="none" normalizeH="0" baseline="0" dirty="0">
+                <a:ln>
+                  <a:noFill/>
+                </a:ln>
+                <a:solidFill>
+                  <a:srgbClr val="808080"/>
+                </a:solidFill>
+                <a:effectLst/>
+                <a:latin typeface="Courier New" panose="02070309020205020404" pitchFamily="49" charset="0"/>
+                <a:cs typeface="Courier New" panose="02070309020205020404" pitchFamily="49" charset="0"/>
+              </a:rPr>
+              <a:t>    </a:t>
+            </a:r>
+            <a:r>
+              <a:rPr kumimoji="0" lang="en-US" altLang="en-US" sz="1100" b="1" i="0" u="none" strike="noStrike" cap="none" normalizeH="0" baseline="0" dirty="0" err="1">
+                <a:ln>
+                  <a:noFill/>
+                </a:ln>
+                <a:solidFill>
+                  <a:srgbClr val="C00000"/>
+                </a:solidFill>
+                <a:effectLst/>
+                <a:latin typeface="Courier New" panose="02070309020205020404" pitchFamily="49" charset="0"/>
+                <a:cs typeface="Courier New" panose="02070309020205020404" pitchFamily="49" charset="0"/>
+              </a:rPr>
+              <a:t>gl_Position</a:t>
+            </a:r>
+            <a:r>
+              <a:rPr kumimoji="0" lang="en-US" altLang="en-US" sz="1100" b="1" i="0" u="none" strike="noStrike" cap="none" normalizeH="0" baseline="0" dirty="0">
+                <a:ln>
+                  <a:noFill/>
+                </a:ln>
+                <a:solidFill>
+                  <a:srgbClr val="C00000"/>
+                </a:solidFill>
+                <a:effectLst/>
+                <a:latin typeface="Courier New" panose="02070309020205020404" pitchFamily="49" charset="0"/>
+                <a:cs typeface="Courier New" panose="02070309020205020404" pitchFamily="49" charset="0"/>
+              </a:rPr>
+              <a:t> </a:t>
+            </a:r>
+            <a:r>
+              <a:rPr kumimoji="0" lang="en-US" altLang="en-US" sz="1100" b="1" i="0" u="none" strike="noStrike" cap="none" normalizeH="0" baseline="0" dirty="0">
+                <a:ln>
+                  <a:noFill/>
+                </a:ln>
+                <a:solidFill>
+                  <a:srgbClr val="008000"/>
+                </a:solidFill>
+                <a:effectLst/>
+                <a:latin typeface="Courier New" panose="02070309020205020404" pitchFamily="49" charset="0"/>
+                <a:cs typeface="Courier New" panose="02070309020205020404" pitchFamily="49" charset="0"/>
+              </a:rPr>
+              <a:t>= </a:t>
+            </a:r>
+            <a:r>
+              <a:rPr kumimoji="0" lang="en-US" altLang="en-US" sz="1100" b="1" i="0" u="none" strike="noStrike" cap="none" normalizeH="0" baseline="0" dirty="0" err="1">
+                <a:ln>
+                  <a:noFill/>
+                </a:ln>
+                <a:solidFill>
+                  <a:srgbClr val="008000"/>
+                </a:solidFill>
+                <a:effectLst/>
+                <a:latin typeface="Courier New" panose="02070309020205020404" pitchFamily="49" charset="0"/>
+                <a:cs typeface="Courier New" panose="02070309020205020404" pitchFamily="49" charset="0"/>
+              </a:rPr>
+              <a:t>u_MVPMatrix</a:t>
+            </a:r>
+            <a:r>
+              <a:rPr lang="en-US" altLang="en-US" sz="1100" i="1" dirty="0">
+                <a:solidFill>
+                  <a:srgbClr val="808080"/>
+                </a:solidFill>
+                <a:latin typeface="Courier New" panose="02070309020205020404" pitchFamily="49" charset="0"/>
+                <a:cs typeface="Courier New" panose="02070309020205020404" pitchFamily="49" charset="0"/>
+              </a:rPr>
+              <a:t> </a:t>
+            </a:r>
+            <a:r>
+              <a:rPr kumimoji="0" lang="en-US" altLang="en-US" sz="1100" b="1" i="0" u="none" strike="noStrike" cap="none" normalizeH="0" baseline="0" dirty="0">
+                <a:ln>
+                  <a:noFill/>
+                </a:ln>
+                <a:solidFill>
+                  <a:srgbClr val="008000"/>
+                </a:solidFill>
+                <a:effectLst/>
+                <a:latin typeface="Courier New" panose="02070309020205020404" pitchFamily="49" charset="0"/>
+                <a:cs typeface="Courier New" panose="02070309020205020404" pitchFamily="49" charset="0"/>
+              </a:rPr>
+              <a:t>* </a:t>
+            </a:r>
+            <a:r>
+              <a:rPr kumimoji="0" lang="en-US" altLang="en-US" sz="1100" b="1" i="0" u="none" strike="noStrike" cap="none" normalizeH="0" baseline="0" dirty="0" err="1">
+                <a:ln>
+                  <a:noFill/>
+                </a:ln>
+                <a:solidFill>
+                  <a:srgbClr val="008000"/>
+                </a:solidFill>
+                <a:effectLst/>
+                <a:latin typeface="Courier New" panose="02070309020205020404" pitchFamily="49" charset="0"/>
+                <a:cs typeface="Courier New" panose="02070309020205020404" pitchFamily="49" charset="0"/>
+              </a:rPr>
+              <a:t>a_Position</a:t>
+            </a:r>
+            <a:r>
+              <a:rPr kumimoji="0" lang="en-US" altLang="en-US" sz="1100" b="1" i="0" u="none" strike="noStrike" cap="none" normalizeH="0" baseline="0" dirty="0">
+                <a:ln>
+                  <a:noFill/>
+                </a:ln>
+                <a:solidFill>
+                  <a:srgbClr val="008000"/>
+                </a:solidFill>
+                <a:effectLst/>
+                <a:latin typeface="Courier New" panose="02070309020205020404" pitchFamily="49" charset="0"/>
+                <a:cs typeface="Courier New" panose="02070309020205020404" pitchFamily="49" charset="0"/>
+              </a:rPr>
+              <a:t>;</a:t>
+            </a:r>
+          </a:p>
+          <a:p>
+            <a:pPr marL="0" marR="0" lvl="0" indent="0" algn="l" defTabSz="914400" rtl="0" eaLnBrk="0" fontAlgn="base" latinLnBrk="0" hangingPunct="0">
+              <a:lnSpc>
+                <a:spcPct val="100000"/>
+              </a:lnSpc>
+              <a:spcBef>
+                <a:spcPct val="0"/>
+              </a:spcBef>
+              <a:spcAft>
+                <a:spcPct val="0"/>
+              </a:spcAft>
+              <a:buClrTx/>
+              <a:buSzTx/>
+              <a:buFontTx/>
+              <a:buNone/>
+              <a:tabLst/>
+            </a:pPr>
+            <a:r>
+              <a:rPr kumimoji="0" lang="en-US" altLang="en-US" sz="1100" b="1" i="0" u="none" strike="noStrike" cap="none" normalizeH="0" baseline="0" dirty="0">
+                <a:ln>
+                  <a:noFill/>
+                </a:ln>
+                <a:solidFill>
+                  <a:srgbClr val="008000"/>
+                </a:solidFill>
+                <a:effectLst/>
+                <a:latin typeface="Courier New" panose="02070309020205020404" pitchFamily="49" charset="0"/>
+                <a:cs typeface="Courier New" panose="02070309020205020404" pitchFamily="49" charset="0"/>
+              </a:rPr>
+              <a:t>}</a:t>
+            </a:r>
+            <a:endParaRPr kumimoji="0" lang="en-US" altLang="en-US" sz="1800" b="0" i="0" u="none" strike="noStrike" cap="none" normalizeH="0" baseline="0" dirty="0">
+              <a:ln>
+                <a:noFill/>
+              </a:ln>
+              <a:solidFill>
+                <a:schemeClr val="tx1"/>
+              </a:solidFill>
+              <a:effectLst/>
+              <a:latin typeface="Arial" panose="020B0604020202020204" pitchFamily="34" charset="0"/>
+            </a:endParaRPr>
+          </a:p>
+        </p:txBody>
+      </p:sp>
+      <p:sp>
+        <p:nvSpPr>
+          <p:cNvPr id="7" name="Rectangle 4">
+            <a:extLst>
+              <a:ext uri="{FF2B5EF4-FFF2-40B4-BE49-F238E27FC236}">
+                <a16:creationId xmlns:a16="http://schemas.microsoft.com/office/drawing/2014/main" id="{ABA3FF19-5137-478D-BEDE-61B6D9E50C13}"/>
+              </a:ext>
+            </a:extLst>
+          </p:cNvPr>
+          <p:cNvSpPr>
+            <a:spLocks noChangeArrowheads="1"/>
+          </p:cNvSpPr>
+          <p:nvPr/>
+        </p:nvSpPr>
+        <p:spPr bwMode="auto">
+          <a:xfrm>
+            <a:off x="431180" y="3482429"/>
+            <a:ext cx="3667992" cy="769441"/>
+          </a:xfrm>
+          <a:prstGeom prst="rect">
+            <a:avLst/>
+          </a:prstGeom>
+          <a:solidFill>
+            <a:srgbClr val="FFFFFF"/>
+          </a:solidFill>
+          <a:ln>
+            <a:noFill/>
+          </a:ln>
+          <a:effectLst/>
+          <a:extLst>
+            <a:ext uri="{91240B29-F687-4F45-9708-019B960494DF}">
+              <a14:hiddenLine xmlns:a14="http://schemas.microsoft.com/office/drawing/2010/main" w="9525">
+                <a:solidFill>
+                  <a:schemeClr val="tx1"/>
+                </a:solidFill>
+                <a:miter lim="800000"/>
+                <a:headEnd/>
+                <a:tailEnd/>
+              </a14:hiddenLine>
+            </a:ext>
+            <a:ext uri="{AF507438-7753-43E0-B8FC-AC1667EBCBE1}">
+              <a14:hiddenEffects xmlns:a14="http://schemas.microsoft.com/office/drawing/2010/main">
+                <a:effectLst>
+                  <a:outerShdw dist="35921" dir="2700000" algn="ctr" rotWithShape="0">
+                    <a:schemeClr val="bg2"/>
+                  </a:outerShdw>
+                </a:effectLst>
+              </a14:hiddenEffects>
+            </a:ext>
+          </a:extLst>
+        </p:spPr>
+        <p:txBody>
+          <a:bodyPr vert="horz" wrap="none" lIns="91440" tIns="45720" rIns="91440" bIns="45720" numCol="1" anchor="ctr" anchorCtr="0" compatLnSpc="1">
+            <a:prstTxWarp prst="textNoShape">
+              <a:avLst/>
+            </a:prstTxWarp>
+            <a:spAutoFit/>
+          </a:bodyPr>
+          <a:lstStyle/>
+          <a:p>
+            <a:pPr marL="0" marR="0" lvl="0" indent="0" algn="l" defTabSz="914400" rtl="0" eaLnBrk="0" fontAlgn="base" latinLnBrk="0" hangingPunct="0">
+              <a:lnSpc>
+                <a:spcPct val="100000"/>
+              </a:lnSpc>
+              <a:spcBef>
+                <a:spcPct val="0"/>
+              </a:spcBef>
+              <a:spcAft>
+                <a:spcPct val="0"/>
+              </a:spcAft>
+              <a:buClrTx/>
+              <a:buSzTx/>
+              <a:buFontTx/>
+              <a:buNone/>
+              <a:tabLst/>
+            </a:pPr>
+            <a:r>
+              <a:rPr kumimoji="0" lang="en-US" altLang="en-US" sz="1100" b="1" i="0" u="none" strike="noStrike" cap="none" normalizeH="0" baseline="0" dirty="0">
+                <a:ln>
+                  <a:noFill/>
+                </a:ln>
+                <a:solidFill>
+                  <a:srgbClr val="008000"/>
+                </a:solidFill>
+                <a:effectLst/>
+                <a:latin typeface="Courier New" panose="02070309020205020404" pitchFamily="49" charset="0"/>
+                <a:cs typeface="Courier New" panose="02070309020205020404" pitchFamily="49" charset="0"/>
+              </a:rPr>
+              <a:t>precision </a:t>
+            </a:r>
+            <a:r>
+              <a:rPr kumimoji="0" lang="en-US" altLang="en-US" sz="1100" b="1" i="0" u="none" strike="noStrike" cap="none" normalizeH="0" baseline="0" dirty="0" err="1">
+                <a:ln>
+                  <a:noFill/>
+                </a:ln>
+                <a:solidFill>
+                  <a:srgbClr val="008000"/>
+                </a:solidFill>
+                <a:effectLst/>
+                <a:latin typeface="Courier New" panose="02070309020205020404" pitchFamily="49" charset="0"/>
+                <a:cs typeface="Courier New" panose="02070309020205020404" pitchFamily="49" charset="0"/>
+              </a:rPr>
+              <a:t>mediump</a:t>
+            </a:r>
+            <a:r>
+              <a:rPr kumimoji="0" lang="en-US" altLang="en-US" sz="1100" b="1" i="0" u="none" strike="noStrike" cap="none" normalizeH="0" baseline="0" dirty="0">
+                <a:ln>
+                  <a:noFill/>
+                </a:ln>
+                <a:solidFill>
+                  <a:srgbClr val="008000"/>
+                </a:solidFill>
+                <a:effectLst/>
+                <a:latin typeface="Courier New" panose="02070309020205020404" pitchFamily="49" charset="0"/>
+                <a:cs typeface="Courier New" panose="02070309020205020404" pitchFamily="49" charset="0"/>
+              </a:rPr>
+              <a:t> float;</a:t>
+            </a:r>
+            <a:r>
+              <a:rPr kumimoji="0" lang="en-US" altLang="en-US" sz="1100" b="0" i="1" u="none" strike="noStrike" cap="none" normalizeH="0" baseline="0" dirty="0">
+                <a:ln>
+                  <a:noFill/>
+                </a:ln>
+                <a:solidFill>
+                  <a:srgbClr val="808080"/>
+                </a:solidFill>
+                <a:effectLst/>
+                <a:latin typeface="Courier New" panose="02070309020205020404" pitchFamily="49" charset="0"/>
+                <a:cs typeface="Courier New" panose="02070309020205020404" pitchFamily="49" charset="0"/>
+              </a:rPr>
+              <a:t> </a:t>
+            </a:r>
+          </a:p>
+          <a:p>
+            <a:pPr marL="0" marR="0" lvl="0" indent="0" algn="l" defTabSz="914400" rtl="0" eaLnBrk="0" fontAlgn="base" latinLnBrk="0" hangingPunct="0">
+              <a:lnSpc>
+                <a:spcPct val="100000"/>
+              </a:lnSpc>
+              <a:spcBef>
+                <a:spcPct val="0"/>
+              </a:spcBef>
+              <a:spcAft>
+                <a:spcPct val="0"/>
+              </a:spcAft>
+              <a:buClrTx/>
+              <a:buSzTx/>
+              <a:buFontTx/>
+              <a:buNone/>
+              <a:tabLst/>
+            </a:pPr>
+            <a:r>
+              <a:rPr kumimoji="0" lang="en-US" altLang="en-US" sz="1100" b="1" i="0" u="none" strike="noStrike" cap="none" normalizeH="0" baseline="0" dirty="0">
+                <a:ln>
+                  <a:noFill/>
+                </a:ln>
+                <a:solidFill>
+                  <a:srgbClr val="008000"/>
+                </a:solidFill>
+                <a:effectLst/>
+                <a:latin typeface="Courier New" panose="02070309020205020404" pitchFamily="49" charset="0"/>
+                <a:cs typeface="Courier New" panose="02070309020205020404" pitchFamily="49" charset="0"/>
+              </a:rPr>
+              <a:t>void </a:t>
+            </a:r>
+            <a:r>
+              <a:rPr kumimoji="0" lang="en-US" altLang="en-US" sz="1100" b="1" i="0" u="none" strike="noStrike" cap="none" normalizeH="0" baseline="0" dirty="0">
+                <a:ln>
+                  <a:noFill/>
+                </a:ln>
+                <a:solidFill>
+                  <a:srgbClr val="7030A0"/>
+                </a:solidFill>
+                <a:effectLst/>
+                <a:latin typeface="Courier New" panose="02070309020205020404" pitchFamily="49" charset="0"/>
+                <a:cs typeface="Courier New" panose="02070309020205020404" pitchFamily="49" charset="0"/>
+              </a:rPr>
+              <a:t>main</a:t>
+            </a:r>
+            <a:r>
+              <a:rPr kumimoji="0" lang="en-US" altLang="en-US" sz="1100" b="1" i="0" u="none" strike="noStrike" cap="none" normalizeH="0" baseline="0" dirty="0">
+                <a:ln>
+                  <a:noFill/>
+                </a:ln>
+                <a:solidFill>
+                  <a:srgbClr val="008000"/>
+                </a:solidFill>
+                <a:effectLst/>
+                <a:latin typeface="Courier New" panose="02070309020205020404" pitchFamily="49" charset="0"/>
+                <a:cs typeface="Courier New" panose="02070309020205020404" pitchFamily="49" charset="0"/>
+              </a:rPr>
+              <a:t>(){</a:t>
+            </a:r>
+          </a:p>
+          <a:p>
+            <a:pPr marL="0" marR="0" lvl="0" indent="0" algn="l" defTabSz="914400" rtl="0" eaLnBrk="0" fontAlgn="base" latinLnBrk="0" hangingPunct="0">
+              <a:lnSpc>
+                <a:spcPct val="100000"/>
+              </a:lnSpc>
+              <a:spcBef>
+                <a:spcPct val="0"/>
+              </a:spcBef>
+              <a:spcAft>
+                <a:spcPct val="0"/>
+              </a:spcAft>
+              <a:buClrTx/>
+              <a:buSzTx/>
+              <a:buFontTx/>
+              <a:buNone/>
+              <a:tabLst/>
+            </a:pPr>
+            <a:r>
+              <a:rPr kumimoji="0" lang="en-US" altLang="en-US" sz="1100" b="1" i="0" u="none" strike="noStrike" cap="none" normalizeH="0" baseline="0" dirty="0">
+                <a:ln>
+                  <a:noFill/>
+                </a:ln>
+                <a:solidFill>
+                  <a:srgbClr val="008000"/>
+                </a:solidFill>
+                <a:effectLst/>
+                <a:latin typeface="Courier New" panose="02070309020205020404" pitchFamily="49" charset="0"/>
+                <a:cs typeface="Courier New" panose="02070309020205020404" pitchFamily="49" charset="0"/>
+              </a:rPr>
+              <a:t>    </a:t>
+            </a:r>
+            <a:r>
+              <a:rPr kumimoji="0" lang="en-US" altLang="en-US" sz="1100" b="1" i="0" u="none" strike="noStrike" cap="none" normalizeH="0" baseline="0" dirty="0" err="1">
+                <a:ln>
+                  <a:noFill/>
+                </a:ln>
+                <a:solidFill>
+                  <a:srgbClr val="C00000"/>
+                </a:solidFill>
+                <a:effectLst/>
+                <a:latin typeface="Courier New" panose="02070309020205020404" pitchFamily="49" charset="0"/>
+                <a:cs typeface="Courier New" panose="02070309020205020404" pitchFamily="49" charset="0"/>
+              </a:rPr>
+              <a:t>gl_FragColor</a:t>
+            </a:r>
+            <a:r>
+              <a:rPr kumimoji="0" lang="en-US" altLang="en-US" sz="1100" b="1" i="0" u="none" strike="noStrike" cap="none" normalizeH="0" baseline="0" dirty="0">
+                <a:ln>
+                  <a:noFill/>
+                </a:ln>
+                <a:solidFill>
+                  <a:srgbClr val="C00000"/>
+                </a:solidFill>
+                <a:effectLst/>
+                <a:latin typeface="Courier New" panose="02070309020205020404" pitchFamily="49" charset="0"/>
+                <a:cs typeface="Courier New" panose="02070309020205020404" pitchFamily="49" charset="0"/>
+              </a:rPr>
+              <a:t> </a:t>
+            </a:r>
+            <a:r>
+              <a:rPr kumimoji="0" lang="en-US" altLang="en-US" sz="1100" b="1" i="0" u="none" strike="noStrike" cap="none" normalizeH="0" baseline="0" dirty="0">
+                <a:ln>
+                  <a:noFill/>
+                </a:ln>
+                <a:solidFill>
+                  <a:srgbClr val="008000"/>
+                </a:solidFill>
+                <a:effectLst/>
+                <a:latin typeface="Courier New" panose="02070309020205020404" pitchFamily="49" charset="0"/>
+                <a:cs typeface="Courier New" panose="02070309020205020404" pitchFamily="49" charset="0"/>
+              </a:rPr>
+              <a:t>= vec4(1.0,0.0,0.0,1.0);</a:t>
+            </a:r>
+          </a:p>
+          <a:p>
+            <a:pPr marL="0" marR="0" lvl="0" indent="0" algn="l" defTabSz="914400" rtl="0" eaLnBrk="0" fontAlgn="base" latinLnBrk="0" hangingPunct="0">
+              <a:lnSpc>
+                <a:spcPct val="100000"/>
+              </a:lnSpc>
+              <a:spcBef>
+                <a:spcPct val="0"/>
+              </a:spcBef>
+              <a:spcAft>
+                <a:spcPct val="0"/>
+              </a:spcAft>
+              <a:buClrTx/>
+              <a:buSzTx/>
+              <a:buFontTx/>
+              <a:buNone/>
+              <a:tabLst/>
+            </a:pPr>
+            <a:r>
+              <a:rPr kumimoji="0" lang="en-US" altLang="en-US" sz="1100" b="1" i="0" u="none" strike="noStrike" cap="none" normalizeH="0" baseline="0" dirty="0">
+                <a:ln>
+                  <a:noFill/>
+                </a:ln>
+                <a:solidFill>
+                  <a:srgbClr val="008000"/>
+                </a:solidFill>
+                <a:effectLst/>
+                <a:latin typeface="Courier New" panose="02070309020205020404" pitchFamily="49" charset="0"/>
+                <a:cs typeface="Courier New" panose="02070309020205020404" pitchFamily="49" charset="0"/>
+              </a:rPr>
+              <a:t>}     </a:t>
+            </a:r>
+            <a:endParaRPr kumimoji="0" lang="en-US" altLang="en-US" sz="1800" b="0" i="0" u="none" strike="noStrike" cap="none" normalizeH="0" baseline="0" dirty="0">
+              <a:ln>
+                <a:noFill/>
+              </a:ln>
+              <a:solidFill>
+                <a:schemeClr val="tx1"/>
+              </a:solidFill>
+              <a:effectLst/>
+              <a:latin typeface="Arial" panose="020B0604020202020204" pitchFamily="34" charset="0"/>
+            </a:endParaRPr>
+          </a:p>
+        </p:txBody>
+      </p:sp>
+    </p:spTree>
+    <p:extLst>
+      <p:ext uri="{BB962C8B-B14F-4D97-AF65-F5344CB8AC3E}">
+        <p14:creationId xmlns:p14="http://schemas.microsoft.com/office/powerpoint/2010/main" val="90974381"/>
+      </p:ext>
+    </p:extLst>
+  </p:cSld>
+  <p:clrMapOvr>
+    <a:masterClrMapping/>
+  </p:clrMapOvr>
+</p:sld>
+</file>
+
+<file path=ppt/slides/slide13.xml><?xml version="1.0" encoding="utf-8"?>
+<p:sld xmlns:a="http://schemas.openxmlformats.org/drawingml/2006/main" xmlns:r="http://schemas.openxmlformats.org/officeDocument/2006/relationships" xmlns:p="http://schemas.openxmlformats.org/presentationml/2006/main">
+  <p:cSld>
+    <p:spTree>
+      <p:nvGrpSpPr>
+        <p:cNvPr id="1" name=""/>
+        <p:cNvGrpSpPr/>
+        <p:nvPr/>
+      </p:nvGrpSpPr>
+      <p:grpSpPr>
+        <a:xfrm>
+          <a:off x="0" y="0"/>
+          <a:ext cx="0" cy="0"/>
+          <a:chOff x="0" y="0"/>
+          <a:chExt cx="0" cy="0"/>
+        </a:xfrm>
+      </p:grpSpPr>
+      <p:sp>
+        <p:nvSpPr>
+          <p:cNvPr id="2" name="Title 1">
+            <a:extLst>
+              <a:ext uri="{FF2B5EF4-FFF2-40B4-BE49-F238E27FC236}">
+                <a16:creationId xmlns:a16="http://schemas.microsoft.com/office/drawing/2014/main" id="{97B16C38-9D98-4BC5-B4B0-76563EA7497D}"/>
+              </a:ext>
+            </a:extLst>
+          </p:cNvPr>
+          <p:cNvSpPr>
+            <a:spLocks noGrp="1"/>
+          </p:cNvSpPr>
+          <p:nvPr>
+            <p:ph type="title"/>
+          </p:nvPr>
+        </p:nvSpPr>
+        <p:spPr/>
+        <p:txBody>
+          <a:bodyPr/>
+          <a:lstStyle/>
+          <a:p>
+            <a:r>
+              <a:rPr lang="en-US" dirty="0" err="1"/>
+              <a:t>Shader</a:t>
+            </a:r>
+            <a:r>
+              <a:rPr lang="zh-CN" altLang="en-US" dirty="0"/>
+              <a:t>的生命周期</a:t>
+            </a:r>
+            <a:endParaRPr lang="en-US" dirty="0"/>
+          </a:p>
+        </p:txBody>
+      </p:sp>
+      <p:sp>
+        <p:nvSpPr>
+          <p:cNvPr id="3" name="Content Placeholder 2">
+            <a:extLst>
+              <a:ext uri="{FF2B5EF4-FFF2-40B4-BE49-F238E27FC236}">
+                <a16:creationId xmlns:a16="http://schemas.microsoft.com/office/drawing/2014/main" id="{D757B39F-3CFF-425B-B113-ADC84C648C1E}"/>
+              </a:ext>
+            </a:extLst>
+          </p:cNvPr>
+          <p:cNvSpPr>
+            <a:spLocks noGrp="1"/>
+          </p:cNvSpPr>
+          <p:nvPr>
+            <p:ph idx="1"/>
+          </p:nvPr>
+        </p:nvSpPr>
+        <p:spPr/>
+        <p:txBody>
+          <a:bodyPr/>
+          <a:lstStyle/>
+          <a:p>
+            <a:r>
+              <a:rPr lang="en-US" dirty="0" err="1"/>
+              <a:t>glCreateShader</a:t>
+            </a:r>
+            <a:endParaRPr lang="en-US" dirty="0"/>
+          </a:p>
+          <a:p>
+            <a:pPr lvl="1"/>
+            <a:r>
+              <a:rPr lang="en-US" dirty="0"/>
+              <a:t>GL_VERTEX_SHADER/GL_FRAGMENT_SHADER</a:t>
+            </a:r>
+          </a:p>
+          <a:p>
+            <a:r>
+              <a:rPr lang="en-US" dirty="0" err="1"/>
+              <a:t>glShaderSource</a:t>
+            </a:r>
+            <a:endParaRPr lang="en-US" dirty="0"/>
+          </a:p>
+          <a:p>
+            <a:r>
+              <a:rPr lang="en-US" dirty="0" err="1"/>
+              <a:t>glCompileShader</a:t>
+            </a:r>
+            <a:endParaRPr lang="en-US" dirty="0"/>
+          </a:p>
+          <a:p>
+            <a:r>
+              <a:rPr lang="en-US" dirty="0" err="1"/>
+              <a:t>glGetShaderiv</a:t>
+            </a:r>
+            <a:endParaRPr lang="en-US" dirty="0"/>
+          </a:p>
+          <a:p>
+            <a:r>
+              <a:rPr lang="en-US" dirty="0" err="1"/>
+              <a:t>glDeleteShader</a:t>
+            </a:r>
+            <a:endParaRPr lang="en-US" dirty="0"/>
+          </a:p>
+        </p:txBody>
+      </p:sp>
+    </p:spTree>
+    <p:extLst>
+      <p:ext uri="{BB962C8B-B14F-4D97-AF65-F5344CB8AC3E}">
+        <p14:creationId xmlns:p14="http://schemas.microsoft.com/office/powerpoint/2010/main" val="3833002465"/>
+      </p:ext>
+    </p:extLst>
+  </p:cSld>
+  <p:clrMapOvr>
+    <a:masterClrMapping/>
+  </p:clrMapOvr>
+</p:sld>
+</file>
+
+<file path=ppt/slides/slide14.xml><?xml version="1.0" encoding="utf-8"?>
+<p:sld xmlns:a="http://schemas.openxmlformats.org/drawingml/2006/main" xmlns:r="http://schemas.openxmlformats.org/officeDocument/2006/relationships" xmlns:p="http://schemas.openxmlformats.org/presentationml/2006/main">
+  <p:cSld>
+    <p:spTree>
+      <p:nvGrpSpPr>
+        <p:cNvPr id="1" name=""/>
+        <p:cNvGrpSpPr/>
+        <p:nvPr/>
+      </p:nvGrpSpPr>
+      <p:grpSpPr>
+        <a:xfrm>
+          <a:off x="0" y="0"/>
+          <a:ext cx="0" cy="0"/>
+          <a:chOff x="0" y="0"/>
+          <a:chExt cx="0" cy="0"/>
+        </a:xfrm>
+      </p:grpSpPr>
+      <p:sp>
+        <p:nvSpPr>
+          <p:cNvPr id="2" name="Title 1">
+            <a:extLst>
+              <a:ext uri="{FF2B5EF4-FFF2-40B4-BE49-F238E27FC236}">
+                <a16:creationId xmlns:a16="http://schemas.microsoft.com/office/drawing/2014/main" id="{0921FB00-A712-4F1E-80AE-06F7FF0B1820}"/>
+              </a:ext>
+            </a:extLst>
+          </p:cNvPr>
+          <p:cNvSpPr>
+            <a:spLocks noGrp="1"/>
+          </p:cNvSpPr>
+          <p:nvPr>
+            <p:ph type="title"/>
+          </p:nvPr>
+        </p:nvSpPr>
+        <p:spPr/>
+        <p:txBody>
+          <a:bodyPr/>
+          <a:lstStyle/>
+          <a:p>
+            <a:r>
+              <a:rPr lang="en-US" dirty="0" err="1"/>
+              <a:t>Shader</a:t>
+            </a:r>
+            <a:r>
+              <a:rPr lang="zh-CN" altLang="en-US" dirty="0"/>
+              <a:t>与</a:t>
+            </a:r>
+            <a:r>
+              <a:rPr lang="en-US" dirty="0"/>
+              <a:t>Program</a:t>
+            </a:r>
+          </a:p>
+        </p:txBody>
+      </p:sp>
+      <p:sp>
+        <p:nvSpPr>
+          <p:cNvPr id="3" name="Content Placeholder 2">
+            <a:extLst>
+              <a:ext uri="{FF2B5EF4-FFF2-40B4-BE49-F238E27FC236}">
+                <a16:creationId xmlns:a16="http://schemas.microsoft.com/office/drawing/2014/main" id="{59EF7FC1-70ED-43B9-B54B-4ABD61063D37}"/>
+              </a:ext>
+            </a:extLst>
+          </p:cNvPr>
+          <p:cNvSpPr>
+            <a:spLocks noGrp="1"/>
+          </p:cNvSpPr>
+          <p:nvPr>
+            <p:ph idx="1"/>
+          </p:nvPr>
+        </p:nvSpPr>
+        <p:spPr/>
+        <p:txBody>
+          <a:bodyPr/>
+          <a:lstStyle/>
+          <a:p>
+            <a:r>
+              <a:rPr lang="en-US" dirty="0"/>
+              <a:t>Program</a:t>
+            </a:r>
+            <a:r>
+              <a:rPr lang="zh-CN" altLang="en-US" dirty="0"/>
+              <a:t>绑定了</a:t>
+            </a:r>
+            <a:r>
+              <a:rPr lang="en-US" altLang="zh-CN" dirty="0"/>
+              <a:t>Vertex </a:t>
+            </a:r>
+            <a:r>
+              <a:rPr lang="en-US" altLang="zh-CN" dirty="0" err="1"/>
+              <a:t>Shader</a:t>
+            </a:r>
+            <a:r>
+              <a:rPr lang="zh-CN" altLang="en-US" dirty="0"/>
+              <a:t>与</a:t>
+            </a:r>
+            <a:r>
+              <a:rPr lang="en-US" altLang="zh-CN" dirty="0"/>
+              <a:t>Fragment </a:t>
+            </a:r>
+            <a:r>
+              <a:rPr lang="en-US" altLang="zh-CN" dirty="0" err="1"/>
+              <a:t>Shader</a:t>
+            </a:r>
+            <a:endParaRPr lang="en-US" altLang="zh-CN" dirty="0"/>
+          </a:p>
+          <a:p>
+            <a:r>
+              <a:rPr lang="en-US" dirty="0" err="1"/>
+              <a:t>glCreateProgram</a:t>
+            </a:r>
+            <a:endParaRPr lang="en-US" dirty="0"/>
+          </a:p>
+          <a:p>
+            <a:r>
+              <a:rPr lang="en-US" dirty="0" err="1"/>
+              <a:t>glAttachShader</a:t>
+            </a:r>
+            <a:endParaRPr lang="en-US" dirty="0"/>
+          </a:p>
+          <a:p>
+            <a:r>
+              <a:rPr lang="en-US" dirty="0" err="1"/>
+              <a:t>glLinkProgram</a:t>
+            </a:r>
+            <a:endParaRPr lang="en-US" dirty="0"/>
+          </a:p>
+          <a:p>
+            <a:r>
+              <a:rPr lang="en-US" dirty="0" err="1"/>
+              <a:t>glGetProgramiv</a:t>
+            </a:r>
+            <a:endParaRPr lang="en-US" dirty="0"/>
+          </a:p>
+          <a:p>
+            <a:r>
+              <a:rPr lang="en-US" dirty="0" err="1"/>
+              <a:t>glDeleteProgram</a:t>
+            </a:r>
+            <a:endParaRPr lang="en-US" dirty="0"/>
+          </a:p>
+          <a:p>
+            <a:r>
+              <a:rPr lang="en-US" dirty="0" err="1"/>
+              <a:t>glUseProgram</a:t>
+            </a:r>
+            <a:endParaRPr lang="en-US" dirty="0"/>
+          </a:p>
+        </p:txBody>
+      </p:sp>
+    </p:spTree>
+    <p:extLst>
+      <p:ext uri="{BB962C8B-B14F-4D97-AF65-F5344CB8AC3E}">
+        <p14:creationId xmlns:p14="http://schemas.microsoft.com/office/powerpoint/2010/main" val="3505270848"/>
+      </p:ext>
+    </p:extLst>
+  </p:cSld>
+  <p:clrMapOvr>
+    <a:masterClrMapping/>
+  </p:clrMapOvr>
+</p:sld>
+</file>
+
+<file path=ppt/slides/slide15.xml><?xml version="1.0" encoding="utf-8"?>
+<p:sld xmlns:a="http://schemas.openxmlformats.org/drawingml/2006/main" xmlns:r="http://schemas.openxmlformats.org/officeDocument/2006/relationships" xmlns:p="http://schemas.openxmlformats.org/presentationml/2006/main">
+  <p:cSld>
+    <p:spTree>
+      <p:nvGrpSpPr>
+        <p:cNvPr id="1" name=""/>
+        <p:cNvGrpSpPr/>
+        <p:nvPr/>
+      </p:nvGrpSpPr>
+      <p:grpSpPr>
+        <a:xfrm>
+          <a:off x="0" y="0"/>
+          <a:ext cx="0" cy="0"/>
+          <a:chOff x="0" y="0"/>
+          <a:chExt cx="0" cy="0"/>
+        </a:xfrm>
+      </p:grpSpPr>
+      <p:sp>
+        <p:nvSpPr>
+          <p:cNvPr id="2" name="Title 1">
+            <a:extLst>
+              <a:ext uri="{FF2B5EF4-FFF2-40B4-BE49-F238E27FC236}">
+                <a16:creationId xmlns:a16="http://schemas.microsoft.com/office/drawing/2014/main" id="{B1B3D3D4-E6D0-4FD6-8A2E-6FD802D8C678}"/>
+              </a:ext>
+            </a:extLst>
+          </p:cNvPr>
+          <p:cNvSpPr>
+            <a:spLocks noGrp="1"/>
+          </p:cNvSpPr>
+          <p:nvPr>
+            <p:ph type="title"/>
+          </p:nvPr>
+        </p:nvSpPr>
+        <p:spPr/>
+        <p:txBody>
+          <a:bodyPr/>
+          <a:lstStyle/>
+          <a:p>
+            <a:r>
+              <a:rPr lang="en-US" dirty="0" err="1"/>
+              <a:t>Attribute,</a:t>
+            </a:r>
+            <a:r>
+              <a:rPr lang="en-US" altLang="zh-CN" dirty="0" err="1"/>
+              <a:t>Uniform,Attribute</a:t>
+            </a:r>
+            <a:r>
+              <a:rPr lang="zh-CN" altLang="en-US" dirty="0"/>
+              <a:t>变量</a:t>
+            </a:r>
+            <a:endParaRPr lang="en-US" dirty="0"/>
+          </a:p>
+        </p:txBody>
+      </p:sp>
+      <p:sp>
+        <p:nvSpPr>
+          <p:cNvPr id="3" name="Content Placeholder 2">
+            <a:extLst>
+              <a:ext uri="{FF2B5EF4-FFF2-40B4-BE49-F238E27FC236}">
+                <a16:creationId xmlns:a16="http://schemas.microsoft.com/office/drawing/2014/main" id="{F6C1C539-C45A-453C-A3B2-EDFAE3B4483C}"/>
+              </a:ext>
+            </a:extLst>
+          </p:cNvPr>
+          <p:cNvSpPr>
+            <a:spLocks noGrp="1"/>
+          </p:cNvSpPr>
+          <p:nvPr>
+            <p:ph idx="1"/>
+          </p:nvPr>
+        </p:nvSpPr>
+        <p:spPr/>
+        <p:txBody>
+          <a:bodyPr/>
+          <a:lstStyle/>
+          <a:p>
+            <a:r>
+              <a:rPr lang="en-US" dirty="0"/>
+              <a:t>uniform</a:t>
+            </a:r>
+            <a:r>
+              <a:rPr lang="zh-CN" altLang="en-US" dirty="0"/>
+              <a:t>变量</a:t>
+            </a:r>
+            <a:endParaRPr lang="en-US" altLang="zh-CN" dirty="0"/>
+          </a:p>
+          <a:p>
+            <a:pPr lvl="1"/>
+            <a:r>
+              <a:rPr lang="zh-CN" altLang="en-US" dirty="0"/>
+              <a:t>对每个顶点都一样的变量</a:t>
+            </a:r>
+            <a:endParaRPr lang="en-US" altLang="zh-CN" dirty="0"/>
+          </a:p>
+          <a:p>
+            <a:pPr lvl="1"/>
+            <a:r>
+              <a:rPr lang="zh-CN" altLang="en-US" dirty="0"/>
+              <a:t>可用于</a:t>
+            </a:r>
+            <a:r>
+              <a:rPr lang="en-US" altLang="zh-CN" dirty="0"/>
+              <a:t>Vertex </a:t>
+            </a:r>
+            <a:r>
+              <a:rPr lang="en-US" altLang="zh-CN" dirty="0" err="1"/>
+              <a:t>Shader+Fragment</a:t>
+            </a:r>
+            <a:r>
+              <a:rPr lang="en-US" altLang="zh-CN" dirty="0"/>
+              <a:t> </a:t>
+            </a:r>
+            <a:r>
+              <a:rPr lang="en-US" altLang="zh-CN" dirty="0" err="1"/>
+              <a:t>Shader</a:t>
+            </a:r>
+            <a:endParaRPr lang="en-US" dirty="0"/>
+          </a:p>
+          <a:p>
+            <a:r>
+              <a:rPr lang="en-US" dirty="0"/>
+              <a:t>Attribute </a:t>
+            </a:r>
+            <a:r>
+              <a:rPr lang="zh-CN" altLang="en-US" dirty="0"/>
+              <a:t>变量</a:t>
+            </a:r>
+            <a:endParaRPr lang="en-US" altLang="zh-CN" dirty="0"/>
+          </a:p>
+          <a:p>
+            <a:pPr lvl="1"/>
+            <a:r>
+              <a:rPr lang="zh-CN" altLang="en-US" dirty="0"/>
+              <a:t>在每个顶点上变化的变量</a:t>
+            </a:r>
+            <a:endParaRPr lang="en-US" altLang="zh-CN" dirty="0"/>
+          </a:p>
+          <a:p>
+            <a:pPr lvl="1"/>
+            <a:r>
+              <a:rPr lang="zh-CN" altLang="en-US" dirty="0"/>
+              <a:t>只能用于</a:t>
+            </a:r>
+            <a:r>
+              <a:rPr lang="en-US" altLang="zh-CN" dirty="0"/>
+              <a:t>Vertex </a:t>
+            </a:r>
+            <a:r>
+              <a:rPr lang="en-US" altLang="zh-CN" dirty="0" err="1"/>
+              <a:t>Shader</a:t>
+            </a:r>
+            <a:endParaRPr lang="en-US" altLang="zh-CN" dirty="0"/>
+          </a:p>
+          <a:p>
+            <a:r>
+              <a:rPr lang="en-US" dirty="0"/>
+              <a:t>Varying </a:t>
+            </a:r>
+            <a:r>
+              <a:rPr lang="zh-CN" altLang="en-US" dirty="0"/>
+              <a:t>变量</a:t>
+            </a:r>
+            <a:endParaRPr lang="en-US" altLang="zh-CN" dirty="0"/>
+          </a:p>
+          <a:p>
+            <a:pPr lvl="1"/>
+            <a:r>
+              <a:rPr lang="zh-CN" altLang="en-US" dirty="0"/>
+              <a:t>用于在</a:t>
+            </a:r>
+            <a:r>
+              <a:rPr lang="en-US" altLang="zh-CN" dirty="0"/>
+              <a:t>Vertex </a:t>
+            </a:r>
+            <a:r>
+              <a:rPr lang="en-US" altLang="zh-CN" dirty="0" err="1"/>
+              <a:t>Shader</a:t>
+            </a:r>
+            <a:r>
+              <a:rPr lang="zh-CN" altLang="en-US" dirty="0"/>
+              <a:t>和</a:t>
+            </a:r>
+            <a:r>
+              <a:rPr lang="en-US" altLang="zh-CN" dirty="0"/>
+              <a:t>Fragment </a:t>
+            </a:r>
+            <a:r>
+              <a:rPr lang="en-US" altLang="zh-CN" dirty="0" err="1"/>
+              <a:t>Shader</a:t>
+            </a:r>
+            <a:r>
+              <a:rPr lang="zh-CN" altLang="en-US" dirty="0"/>
+              <a:t>之间传值</a:t>
+            </a:r>
+            <a:endParaRPr lang="en-US" dirty="0"/>
+          </a:p>
+        </p:txBody>
+      </p:sp>
+    </p:spTree>
+    <p:extLst>
+      <p:ext uri="{BB962C8B-B14F-4D97-AF65-F5344CB8AC3E}">
+        <p14:creationId xmlns:p14="http://schemas.microsoft.com/office/powerpoint/2010/main" val="1265324890"/>
+      </p:ext>
+    </p:extLst>
+  </p:cSld>
+  <p:clrMapOvr>
+    <a:masterClrMapping/>
+  </p:clrMapOvr>
+</p:sld>
+</file>
+
+<file path=ppt/slides/slide16.xml><?xml version="1.0" encoding="utf-8"?>
+<p:sld xmlns:a="http://schemas.openxmlformats.org/drawingml/2006/main" xmlns:r="http://schemas.openxmlformats.org/officeDocument/2006/relationships" xmlns:p="http://schemas.openxmlformats.org/presentationml/2006/main">
+  <p:cSld>
+    <p:spTree>
+      <p:nvGrpSpPr>
+        <p:cNvPr id="1" name=""/>
+        <p:cNvGrpSpPr/>
+        <p:nvPr/>
+      </p:nvGrpSpPr>
+      <p:grpSpPr>
+        <a:xfrm>
+          <a:off x="0" y="0"/>
+          <a:ext cx="0" cy="0"/>
+          <a:chOff x="0" y="0"/>
+          <a:chExt cx="0" cy="0"/>
+        </a:xfrm>
+      </p:grpSpPr>
+      <p:sp>
+        <p:nvSpPr>
+          <p:cNvPr id="2" name="Title 1">
+            <a:extLst>
+              <a:ext uri="{FF2B5EF4-FFF2-40B4-BE49-F238E27FC236}">
+                <a16:creationId xmlns:a16="http://schemas.microsoft.com/office/drawing/2014/main" id="{316F1DAC-3134-4AAB-8844-168AB0473639}"/>
+              </a:ext>
+            </a:extLst>
+          </p:cNvPr>
+          <p:cNvSpPr>
+            <a:spLocks noGrp="1"/>
+          </p:cNvSpPr>
+          <p:nvPr>
+            <p:ph type="title"/>
+          </p:nvPr>
+        </p:nvSpPr>
+        <p:spPr/>
+        <p:txBody>
+          <a:bodyPr/>
+          <a:lstStyle/>
+          <a:p>
+            <a:r>
+              <a:rPr lang="zh-CN" altLang="en-US" dirty="0"/>
+              <a:t>如何传值给</a:t>
+            </a:r>
+            <a:r>
+              <a:rPr lang="en-US" altLang="zh-CN" dirty="0" err="1"/>
+              <a:t>Shader</a:t>
+            </a:r>
+            <a:r>
+              <a:rPr lang="zh-CN" altLang="en-US" dirty="0"/>
+              <a:t>变量？</a:t>
+            </a:r>
+            <a:endParaRPr lang="en-US" dirty="0"/>
+          </a:p>
+        </p:txBody>
+      </p:sp>
+      <p:sp>
+        <p:nvSpPr>
+          <p:cNvPr id="3" name="Content Placeholder 2">
+            <a:extLst>
+              <a:ext uri="{FF2B5EF4-FFF2-40B4-BE49-F238E27FC236}">
+                <a16:creationId xmlns:a16="http://schemas.microsoft.com/office/drawing/2014/main" id="{174EF21C-2743-4C80-87A8-AF0F78F1348C}"/>
+              </a:ext>
+            </a:extLst>
+          </p:cNvPr>
+          <p:cNvSpPr>
+            <a:spLocks noGrp="1"/>
+          </p:cNvSpPr>
+          <p:nvPr>
+            <p:ph idx="1"/>
+          </p:nvPr>
+        </p:nvSpPr>
+        <p:spPr/>
+        <p:txBody>
+          <a:bodyPr/>
+          <a:lstStyle/>
+          <a:p>
+            <a:r>
+              <a:rPr lang="en-US" dirty="0"/>
+              <a:t>Uniform</a:t>
+            </a:r>
+            <a:r>
+              <a:rPr lang="zh-CN" altLang="en-US" dirty="0"/>
+              <a:t>变量</a:t>
+            </a:r>
+            <a:endParaRPr lang="en-US" dirty="0"/>
+          </a:p>
+          <a:p>
+            <a:pPr lvl="1"/>
+            <a:r>
+              <a:rPr lang="en-US" dirty="0" err="1"/>
+              <a:t>glGetUniformLocation</a:t>
+            </a:r>
+            <a:endParaRPr lang="en-US" dirty="0"/>
+          </a:p>
+          <a:p>
+            <a:pPr lvl="1"/>
+            <a:r>
+              <a:rPr lang="en-US" dirty="0" err="1"/>
+              <a:t>glUniform</a:t>
+            </a:r>
+            <a:r>
+              <a:rPr lang="en-US" dirty="0"/>
+              <a:t>	Matrix4fv</a:t>
+            </a:r>
+          </a:p>
+          <a:p>
+            <a:r>
+              <a:rPr lang="en-US" dirty="0"/>
+              <a:t>Attribute</a:t>
+            </a:r>
+            <a:r>
+              <a:rPr lang="zh-CN" altLang="en-US" dirty="0"/>
+              <a:t>变量</a:t>
+            </a:r>
+            <a:endParaRPr lang="en-US" altLang="zh-CN" dirty="0"/>
+          </a:p>
+          <a:p>
+            <a:pPr lvl="1"/>
+            <a:r>
+              <a:rPr lang="en-US" dirty="0" err="1"/>
+              <a:t>glGetAttributeLocation</a:t>
+            </a:r>
+            <a:endParaRPr lang="en-US" dirty="0"/>
+          </a:p>
+          <a:p>
+            <a:pPr lvl="1"/>
+            <a:r>
+              <a:rPr lang="en-US" dirty="0" err="1"/>
+              <a:t>glVertexAttribPointer</a:t>
+            </a:r>
+            <a:endParaRPr lang="en-US" dirty="0"/>
+          </a:p>
+          <a:p>
+            <a:pPr lvl="1"/>
+            <a:r>
+              <a:rPr lang="en-US" dirty="0" err="1"/>
+              <a:t>glEnableVertexAttribArray</a:t>
+            </a:r>
+            <a:endParaRPr lang="en-US" dirty="0"/>
+          </a:p>
+          <a:p>
+            <a:pPr lvl="1"/>
+            <a:r>
+              <a:rPr lang="en-US" dirty="0" err="1"/>
+              <a:t>glDisableVertexAttribArray</a:t>
+            </a:r>
+            <a:endParaRPr lang="en-US" dirty="0"/>
+          </a:p>
+        </p:txBody>
+      </p:sp>
+    </p:spTree>
+    <p:extLst>
+      <p:ext uri="{BB962C8B-B14F-4D97-AF65-F5344CB8AC3E}">
+        <p14:creationId xmlns:p14="http://schemas.microsoft.com/office/powerpoint/2010/main" val="2167352457"/>
+      </p:ext>
+    </p:extLst>
+  </p:cSld>
+  <p:clrMapOvr>
+    <a:masterClrMapping/>
+  </p:clrMapOvr>
+</p:sld>
+</file>
+
+<file path=ppt/slides/slide17.xml><?xml version="1.0" encoding="utf-8"?>
+<p:sld xmlns:a="http://schemas.openxmlformats.org/drawingml/2006/main" xmlns:r="http://schemas.openxmlformats.org/officeDocument/2006/relationships" xmlns:p="http://schemas.openxmlformats.org/presentationml/2006/main">
+  <p:cSld>
+    <p:spTree>
+      <p:nvGrpSpPr>
+        <p:cNvPr id="1" name=""/>
+        <p:cNvGrpSpPr/>
+        <p:nvPr/>
+      </p:nvGrpSpPr>
+      <p:grpSpPr>
+        <a:xfrm>
+          <a:off x="0" y="0"/>
+          <a:ext cx="0" cy="0"/>
+          <a:chOff x="0" y="0"/>
+          <a:chExt cx="0" cy="0"/>
+        </a:xfrm>
+      </p:grpSpPr>
+      <p:sp>
+        <p:nvSpPr>
+          <p:cNvPr id="2" name="Title 1">
+            <a:extLst>
+              <a:ext uri="{FF2B5EF4-FFF2-40B4-BE49-F238E27FC236}">
+                <a16:creationId xmlns:a16="http://schemas.microsoft.com/office/drawing/2014/main" id="{840510D6-6267-4908-938E-4B0EBAFCF267}"/>
+              </a:ext>
+            </a:extLst>
+          </p:cNvPr>
+          <p:cNvSpPr>
+            <a:spLocks noGrp="1"/>
+          </p:cNvSpPr>
+          <p:nvPr>
+            <p:ph type="title"/>
+          </p:nvPr>
+        </p:nvSpPr>
+        <p:spPr/>
+        <p:txBody>
+          <a:bodyPr/>
+          <a:lstStyle/>
+          <a:p>
+            <a:r>
+              <a:rPr lang="en-US" dirty="0"/>
+              <a:t>Draw it!</a:t>
+            </a:r>
+          </a:p>
+        </p:txBody>
+      </p:sp>
+      <p:sp>
+        <p:nvSpPr>
+          <p:cNvPr id="3" name="Content Placeholder 2">
+            <a:extLst>
+              <a:ext uri="{FF2B5EF4-FFF2-40B4-BE49-F238E27FC236}">
+                <a16:creationId xmlns:a16="http://schemas.microsoft.com/office/drawing/2014/main" id="{D9B60481-3026-4C6B-A9D3-B4718E2E6489}"/>
+              </a:ext>
+            </a:extLst>
+          </p:cNvPr>
+          <p:cNvSpPr>
+            <a:spLocks noGrp="1"/>
+          </p:cNvSpPr>
+          <p:nvPr>
+            <p:ph idx="1"/>
+          </p:nvPr>
+        </p:nvSpPr>
+        <p:spPr/>
+        <p:txBody>
+          <a:bodyPr/>
+          <a:lstStyle/>
+          <a:p>
+            <a:r>
+              <a:rPr lang="en-US" dirty="0" err="1"/>
+              <a:t>glDrawArrays</a:t>
+            </a:r>
+            <a:endParaRPr lang="en-US" dirty="0"/>
+          </a:p>
+          <a:p>
+            <a:r>
+              <a:rPr lang="zh-CN" altLang="en-US" dirty="0"/>
+              <a:t>书上学来终觉浅</a:t>
+            </a:r>
+            <a:endParaRPr lang="en-US" altLang="zh-CN" dirty="0"/>
+          </a:p>
+          <a:p>
+            <a:r>
+              <a:rPr lang="zh-CN" altLang="en-US" dirty="0"/>
+              <a:t>得知此事要躬行</a:t>
+            </a:r>
+            <a:endParaRPr lang="en-US" dirty="0"/>
+          </a:p>
+        </p:txBody>
+      </p:sp>
+    </p:spTree>
+    <p:extLst>
+      <p:ext uri="{BB962C8B-B14F-4D97-AF65-F5344CB8AC3E}">
+        <p14:creationId xmlns:p14="http://schemas.microsoft.com/office/powerpoint/2010/main" val="4061113383"/>
+      </p:ext>
+    </p:extLst>
+  </p:cSld>
+  <p:clrMapOvr>
+    <a:masterClrMapping/>
+  </p:clrMapOvr>
+</p:sld>
+</file>
+
+<file path=ppt/slides/slide18.xml><?xml version="1.0" encoding="utf-8"?>
+<p:sld xmlns:a="http://schemas.openxmlformats.org/drawingml/2006/main" xmlns:r="http://schemas.openxmlformats.org/officeDocument/2006/relationships" xmlns:p="http://schemas.openxmlformats.org/presentationml/2006/main">
+  <p:cSld>
+    <p:spTree>
+      <p:nvGrpSpPr>
+        <p:cNvPr id="1" name=""/>
+        <p:cNvGrpSpPr/>
+        <p:nvPr/>
+      </p:nvGrpSpPr>
+      <p:grpSpPr>
+        <a:xfrm>
+          <a:off x="0" y="0"/>
+          <a:ext cx="0" cy="0"/>
+          <a:chOff x="0" y="0"/>
+          <a:chExt cx="0" cy="0"/>
+        </a:xfrm>
+      </p:grpSpPr>
+      <p:sp>
+        <p:nvSpPr>
+          <p:cNvPr id="2" name="Title 1">
+            <a:extLst>
+              <a:ext uri="{FF2B5EF4-FFF2-40B4-BE49-F238E27FC236}">
                 <a16:creationId xmlns:a16="http://schemas.microsoft.com/office/drawing/2014/main" id="{BB1AF60F-BD7E-46FA-B377-F27C1DF3BF54}"/>
               </a:ext>
             </a:extLst>
@@ -3671,7 +5483,12 @@
             <p:ph type="title"/>
           </p:nvPr>
         </p:nvSpPr>
-        <p:spPr/>
+        <p:spPr>
+          <a:xfrm>
+            <a:off x="412595" y="184072"/>
+            <a:ext cx="8229600" cy="857250"/>
+          </a:xfrm>
+        </p:spPr>
         <p:txBody>
           <a:bodyPr/>
           <a:lstStyle/>
@@ -3705,7 +5522,7 @@
         </p:nvSpPr>
         <p:spPr>
           <a:xfrm>
-            <a:off x="1066800" y="655637"/>
+            <a:off x="1111405" y="655637"/>
             <a:ext cx="8229600" cy="3394075"/>
           </a:xfrm>
         </p:spPr>
@@ -3713,32 +5530,41 @@
           <a:bodyPr/>
           <a:lstStyle/>
           <a:p>
-            <a:pPr marL="0" indent="0">
-              <a:lnSpc>
-                <a:spcPct val="200000"/>
-              </a:lnSpc>
-              <a:buNone/>
-            </a:pPr>
-            <a:endParaRPr lang="en-US" altLang="zh-CN" dirty="0">
-              <a:latin typeface="Microsoft YaHei" panose="020B0503020204020204" pitchFamily="34" charset="-122"/>
-              <a:ea typeface="Microsoft YaHei" panose="020B0503020204020204" pitchFamily="34" charset="-122"/>
-            </a:endParaRPr>
-          </a:p>
-          <a:p>
             <a:pPr>
               <a:lnSpc>
                 <a:spcPct val="200000"/>
               </a:lnSpc>
             </a:pPr>
             <a:r>
-              <a:rPr lang="en-US" dirty="0"/>
-              <a:t>OpenGL</a:t>
-            </a:r>
-            <a:r>
               <a:rPr lang="zh-CN" altLang="en-US" dirty="0"/>
-              <a:t>家族概要介绍</a:t>
-            </a:r>
-            <a:endParaRPr lang="en-US" altLang="zh-CN" dirty="0"/>
+              <a:t>写</a:t>
+            </a:r>
+            <a:r>
+              <a:rPr lang="en-US" altLang="zh-CN" dirty="0"/>
+              <a:t>Shaders</a:t>
+            </a:r>
+          </a:p>
+          <a:p>
+            <a:pPr lvl="1">
+              <a:lnSpc>
+                <a:spcPct val="200000"/>
+              </a:lnSpc>
+            </a:pPr>
+            <a:r>
+              <a:rPr lang="en-US" altLang="zh-CN" dirty="0"/>
+              <a:t>Vertex Shader</a:t>
+            </a:r>
+          </a:p>
+          <a:p>
+            <a:pPr lvl="1">
+              <a:lnSpc>
+                <a:spcPct val="200000"/>
+              </a:lnSpc>
+            </a:pPr>
+            <a:r>
+              <a:rPr lang="en-US" altLang="zh-CN" dirty="0"/>
+              <a:t>Fragment Shader</a:t>
+            </a:r>
           </a:p>
           <a:p>
             <a:pPr>
@@ -3748,9 +5574,44 @@
             </a:pPr>
             <a:r>
               <a:rPr lang="zh-CN" altLang="en-US" dirty="0"/>
-              <a:t>渲染流水线及坐标系</a:t>
+              <a:t>赋值给</a:t>
+            </a:r>
+            <a:r>
+              <a:rPr lang="en-US" altLang="zh-CN" dirty="0"/>
+              <a:t>Uniform/Attribute</a:t>
+            </a:r>
+            <a:r>
+              <a:rPr lang="zh-CN" altLang="en-US" dirty="0"/>
+              <a:t>变量</a:t>
+            </a:r>
+            <a:endParaRPr lang="en-US" altLang="zh-CN" dirty="0"/>
+          </a:p>
+          <a:p>
+            <a:pPr lvl="1">
+              <a:lnSpc>
+                <a:spcPct val="200000"/>
+              </a:lnSpc>
+            </a:pPr>
+            <a:r>
+              <a:rPr lang="en-US" dirty="0" err="1"/>
+              <a:t>mvpMatrix</a:t>
             </a:r>
             <a:endParaRPr lang="en-US" dirty="0"/>
+          </a:p>
+          <a:p>
+            <a:pPr lvl="1">
+              <a:lnSpc>
+                <a:spcPct val="200000"/>
+              </a:lnSpc>
+            </a:pPr>
+            <a:r>
+              <a:rPr lang="en-US" dirty="0"/>
+              <a:t>vertices and buffer</a:t>
+            </a:r>
+            <a:endParaRPr lang="en-US" altLang="zh-CN" dirty="0">
+              <a:latin typeface="Microsoft YaHei" panose="020B0503020204020204" pitchFamily="34" charset="-122"/>
+              <a:ea typeface="Microsoft YaHei" panose="020B0503020204020204" pitchFamily="34" charset="-122"/>
+            </a:endParaRPr>
           </a:p>
         </p:txBody>
       </p:sp>
@@ -3764,245 +5625,6 @@
   <p:clrMapOvr>
     <a:masterClrMapping/>
   </p:clrMapOvr>
-  <p:timing>
-    <p:tnLst>
-      <p:par>
-        <p:cTn id="1" dur="indefinite" restart="never" nodeType="tmRoot">
-          <p:childTnLst>
-            <p:seq concurrent="1" nextAc="seek">
-              <p:cTn id="2" dur="indefinite" nodeType="mainSeq">
-                <p:childTnLst>
-                  <p:par>
-                    <p:cTn id="3" fill="hold">
-                      <p:stCondLst>
-                        <p:cond delay="indefinite"/>
-                        <p:cond evt="onBegin" delay="0">
-                          <p:tn val="2"/>
-                        </p:cond>
-                      </p:stCondLst>
-                      <p:childTnLst>
-                        <p:par>
-                          <p:cTn id="4" fill="hold">
-                            <p:stCondLst>
-                              <p:cond delay="0"/>
-                            </p:stCondLst>
-                            <p:childTnLst>
-                              <p:par>
-                                <p:cTn id="5" presetID="2" presetClass="entr" presetSubtype="4" fill="hold" nodeType="withEffect">
-                                  <p:stCondLst>
-                                    <p:cond delay="0"/>
-                                  </p:stCondLst>
-                                  <p:childTnLst>
-                                    <p:set>
-                                      <p:cBhvr>
-                                        <p:cTn id="6" dur="1" fill="hold">
-                                          <p:stCondLst>
-                                            <p:cond delay="0"/>
-                                          </p:stCondLst>
-                                        </p:cTn>
-                                        <p:tgtEl>
-                                          <p:spTgt spid="3">
-                                            <p:txEl>
-                                              <p:pRg st="1" end="1"/>
-                                            </p:txEl>
-                                          </p:spTgt>
-                                        </p:tgtEl>
-                                        <p:attrNameLst>
-                                          <p:attrName>style.visibility</p:attrName>
-                                        </p:attrNameLst>
-                                      </p:cBhvr>
-                                      <p:to>
-                                        <p:strVal val="visible"/>
-                                      </p:to>
-                                    </p:set>
-                                    <p:anim calcmode="lin" valueType="num">
-                                      <p:cBhvr additive="base">
-                                        <p:cTn id="7" dur="500" fill="hold"/>
-                                        <p:tgtEl>
-                                          <p:spTgt spid="3">
-                                            <p:txEl>
-                                              <p:pRg st="1" end="1"/>
-                                            </p:txEl>
-                                          </p:spTgt>
-                                        </p:tgtEl>
-                                        <p:attrNameLst>
-                                          <p:attrName>ppt_x</p:attrName>
-                                        </p:attrNameLst>
-                                      </p:cBhvr>
-                                      <p:tavLst>
-                                        <p:tav tm="0">
-                                          <p:val>
-                                            <p:strVal val="#ppt_x"/>
-                                          </p:val>
-                                        </p:tav>
-                                        <p:tav tm="100000">
-                                          <p:val>
-                                            <p:strVal val="#ppt_x"/>
-                                          </p:val>
-                                        </p:tav>
-                                      </p:tavLst>
-                                    </p:anim>
-                                    <p:anim calcmode="lin" valueType="num">
-                                      <p:cBhvr additive="base">
-                                        <p:cTn id="8" dur="500" fill="hold"/>
-                                        <p:tgtEl>
-                                          <p:spTgt spid="3">
-                                            <p:txEl>
-                                              <p:pRg st="1" end="1"/>
-                                            </p:txEl>
-                                          </p:spTgt>
-                                        </p:tgtEl>
-                                        <p:attrNameLst>
-                                          <p:attrName>ppt_y</p:attrName>
-                                        </p:attrNameLst>
-                                      </p:cBhvr>
-                                      <p:tavLst>
-                                        <p:tav tm="0">
-                                          <p:val>
-                                            <p:strVal val="1+#ppt_h/2"/>
-                                          </p:val>
-                                        </p:tav>
-                                        <p:tav tm="100000">
-                                          <p:val>
-                                            <p:strVal val="#ppt_y"/>
-                                          </p:val>
-                                        </p:tav>
-                                      </p:tavLst>
-                                    </p:anim>
-                                  </p:childTnLst>
-                                </p:cTn>
-                              </p:par>
-                            </p:childTnLst>
-                          </p:cTn>
-                        </p:par>
-                      </p:childTnLst>
-                    </p:cTn>
-                  </p:par>
-                  <p:par>
-                    <p:cTn id="9" fill="hold">
-                      <p:stCondLst>
-                        <p:cond delay="indefinite"/>
-                      </p:stCondLst>
-                      <p:childTnLst>
-                        <p:par>
-                          <p:cTn id="10" fill="hold">
-                            <p:stCondLst>
-                              <p:cond delay="0"/>
-                            </p:stCondLst>
-                            <p:childTnLst>
-                              <p:par>
-                                <p:cTn id="11" presetID="2" presetClass="entr" presetSubtype="4" fill="hold" nodeType="clickEffect">
-                                  <p:stCondLst>
-                                    <p:cond delay="0"/>
-                                  </p:stCondLst>
-                                  <p:childTnLst>
-                                    <p:set>
-                                      <p:cBhvr>
-                                        <p:cTn id="12" dur="1" fill="hold">
-                                          <p:stCondLst>
-                                            <p:cond delay="0"/>
-                                          </p:stCondLst>
-                                        </p:cTn>
-                                        <p:tgtEl>
-                                          <p:spTgt spid="3">
-                                            <p:txEl>
-                                              <p:pRg st="2" end="2"/>
-                                            </p:txEl>
-                                          </p:spTgt>
-                                        </p:tgtEl>
-                                        <p:attrNameLst>
-                                          <p:attrName>style.visibility</p:attrName>
-                                        </p:attrNameLst>
-                                      </p:cBhvr>
-                                      <p:to>
-                                        <p:strVal val="visible"/>
-                                      </p:to>
-                                    </p:set>
-                                    <p:anim calcmode="lin" valueType="num">
-                                      <p:cBhvr additive="base">
-                                        <p:cTn id="13" dur="500" fill="hold"/>
-                                        <p:tgtEl>
-                                          <p:spTgt spid="3">
-                                            <p:txEl>
-                                              <p:pRg st="2" end="2"/>
-                                            </p:txEl>
-                                          </p:spTgt>
-                                        </p:tgtEl>
-                                        <p:attrNameLst>
-                                          <p:attrName>ppt_x</p:attrName>
-                                        </p:attrNameLst>
-                                      </p:cBhvr>
-                                      <p:tavLst>
-                                        <p:tav tm="0">
-                                          <p:val>
-                                            <p:strVal val="#ppt_x"/>
-                                          </p:val>
-                                        </p:tav>
-                                        <p:tav tm="100000">
-                                          <p:val>
-                                            <p:strVal val="#ppt_x"/>
-                                          </p:val>
-                                        </p:tav>
-                                      </p:tavLst>
-                                    </p:anim>
-                                    <p:anim calcmode="lin" valueType="num">
-                                      <p:cBhvr additive="base">
-                                        <p:cTn id="14" dur="500" fill="hold"/>
-                                        <p:tgtEl>
-                                          <p:spTgt spid="3">
-                                            <p:txEl>
-                                              <p:pRg st="2" end="2"/>
-                                            </p:txEl>
-                                          </p:spTgt>
-                                        </p:tgtEl>
-                                        <p:attrNameLst>
-                                          <p:attrName>ppt_y</p:attrName>
-                                        </p:attrNameLst>
-                                      </p:cBhvr>
-                                      <p:tavLst>
-                                        <p:tav tm="0">
-                                          <p:val>
-                                            <p:strVal val="1+#ppt_h/2"/>
-                                          </p:val>
-                                        </p:tav>
-                                        <p:tav tm="100000">
-                                          <p:val>
-                                            <p:strVal val="#ppt_y"/>
-                                          </p:val>
-                                        </p:tav>
-                                      </p:tavLst>
-                                    </p:anim>
-                                  </p:childTnLst>
-                                </p:cTn>
-                              </p:par>
-                            </p:childTnLst>
-                          </p:cTn>
-                        </p:par>
-                      </p:childTnLst>
-                    </p:cTn>
-                  </p:par>
-                </p:childTnLst>
-              </p:cTn>
-              <p:prevCondLst>
-                <p:cond evt="onPrev" delay="0">
-                  <p:tgtEl>
-                    <p:sldTgt/>
-                  </p:tgtEl>
-                </p:cond>
-              </p:prevCondLst>
-              <p:nextCondLst>
-                <p:cond evt="onNext" delay="0">
-                  <p:tgtEl>
-                    <p:sldTgt/>
-                  </p:tgtEl>
-                </p:cond>
-              </p:nextCondLst>
-            </p:seq>
-          </p:childTnLst>
-        </p:cTn>
-      </p:par>
-    </p:tnLst>
-  </p:timing>
 </p:sld>
 </file>
 
@@ -4099,7 +5721,7 @@
         </p:blipFill>
         <p:spPr>
           <a:xfrm>
-            <a:off x="3886200" y="900066"/>
+            <a:off x="5181600" y="819150"/>
             <a:ext cx="2030022" cy="3994241"/>
           </a:xfrm>
           <a:prstGeom prst="rect">
@@ -4693,7 +6315,7 @@
           <p:cNvPr id="2" name="Title 1">
             <a:extLst>
               <a:ext uri="{FF2B5EF4-FFF2-40B4-BE49-F238E27FC236}">
-                <a16:creationId xmlns:a16="http://schemas.microsoft.com/office/drawing/2014/main" id="{AD5FED0D-3B76-47A5-AE6E-D626C074A8F3}"/>
+                <a16:creationId xmlns:a16="http://schemas.microsoft.com/office/drawing/2014/main" id="{78F43299-4858-49AA-87C6-EBDA47EC2480}"/>
               </a:ext>
             </a:extLst>
           </p:cNvPr>
@@ -4710,9 +6332,10 @@
           <a:lstStyle/>
           <a:p>
             <a:r>
-              <a:rPr lang="en-US" dirty="0"/>
-              <a:t>Matrix functions(Model)</a:t>
-            </a:r>
+              <a:rPr lang="en-US" altLang="zh-CN" dirty="0"/>
+              <a:t>Talk is cheap, let us code</a:t>
+            </a:r>
+            <a:endParaRPr lang="en-US" dirty="0"/>
           </a:p>
         </p:txBody>
       </p:sp>
@@ -4721,7 +6344,7 @@
           <p:cNvPr id="3" name="Content Placeholder 2">
             <a:extLst>
               <a:ext uri="{FF2B5EF4-FFF2-40B4-BE49-F238E27FC236}">
-                <a16:creationId xmlns:a16="http://schemas.microsoft.com/office/drawing/2014/main" id="{D237B454-110A-4991-B112-A8F4C2B7C986}"/>
+                <a16:creationId xmlns:a16="http://schemas.microsoft.com/office/drawing/2014/main" id="{EA1323B9-015D-49C3-9E14-F775370E31C6}"/>
               </a:ext>
             </a:extLst>
           </p:cNvPr>
@@ -4738,83 +6361,9 @@
           <a:lstStyle/>
           <a:p>
             <a:r>
-              <a:rPr lang="en-US" dirty="0" err="1"/>
-              <a:t>Matrix.setIdentity</a:t>
-            </a:r>
-            <a:endParaRPr lang="en-US" dirty="0"/>
-          </a:p>
-          <a:p>
-            <a:r>
-              <a:rPr lang="en-US" dirty="0" err="1"/>
-              <a:t>Matrix.scaleM</a:t>
-            </a:r>
-            <a:r>
-              <a:rPr lang="en-US" dirty="0"/>
-              <a:t> (</a:t>
-            </a:r>
-            <a:r>
               <a:rPr lang="zh-CN" altLang="en-US" dirty="0"/>
-              <a:t>缩放</a:t>
-            </a:r>
-            <a:r>
-              <a:rPr lang="en-US" dirty="0"/>
-              <a:t>)</a:t>
-            </a:r>
-          </a:p>
-          <a:p>
-            <a:pPr lvl="1"/>
-            <a:r>
-              <a:rPr lang="en-US" dirty="0" err="1"/>
-              <a:t>x,y,z</a:t>
-            </a:r>
-            <a:endParaRPr lang="en-US" dirty="0"/>
-          </a:p>
-          <a:p>
-            <a:r>
-              <a:rPr lang="en-US" dirty="0" err="1"/>
-              <a:t>Matrix.translateM</a:t>
-            </a:r>
-            <a:r>
-              <a:rPr lang="en-US" dirty="0"/>
-              <a:t>(</a:t>
-            </a:r>
-            <a:r>
-              <a:rPr lang="zh-CN" altLang="en-US" dirty="0"/>
-              <a:t>平移</a:t>
-            </a:r>
-            <a:r>
-              <a:rPr lang="en-US" dirty="0"/>
-              <a:t>)</a:t>
-            </a:r>
-          </a:p>
-          <a:p>
-            <a:pPr lvl="1"/>
-            <a:r>
-              <a:rPr lang="en-US" dirty="0" err="1"/>
-              <a:t>x,y,z</a:t>
-            </a:r>
-            <a:endParaRPr lang="en-US" dirty="0"/>
-          </a:p>
-          <a:p>
-            <a:r>
-              <a:rPr lang="en-US" dirty="0" err="1"/>
-              <a:t>Matrix.rotateM</a:t>
-            </a:r>
-            <a:r>
-              <a:rPr lang="en-US" dirty="0"/>
-              <a:t>(</a:t>
-            </a:r>
-            <a:r>
-              <a:rPr lang="zh-CN" altLang="en-US" dirty="0"/>
-              <a:t>旋转</a:t>
-            </a:r>
-            <a:r>
-              <a:rPr lang="en-US" dirty="0"/>
-              <a:t>)  ????</a:t>
-            </a:r>
-          </a:p>
-          <a:p>
-            <a:pPr lvl="1"/>
+              <a:t>一个黑屏</a:t>
+            </a:r>
             <a:endParaRPr lang="en-US" dirty="0"/>
           </a:p>
         </p:txBody>
@@ -4822,7 +6371,7 @@
     </p:spTree>
     <p:extLst>
       <p:ext uri="{BB962C8B-B14F-4D97-AF65-F5344CB8AC3E}">
-        <p14:creationId xmlns:p14="http://schemas.microsoft.com/office/powerpoint/2010/main" val="4100477375"/>
+        <p14:creationId xmlns:p14="http://schemas.microsoft.com/office/powerpoint/2010/main" val="2356470419"/>
       </p:ext>
     </p:extLst>
   </p:cSld>
@@ -5008,203 +6557,6 @@
   <p:clrMapOvr>
     <a:masterClrMapping/>
   </p:clrMapOvr>
-  <p:timing>
-    <p:tnLst>
-      <p:par>
-        <p:cTn id="1" dur="indefinite" restart="never" nodeType="tmRoot">
-          <p:childTnLst>
-            <p:seq concurrent="1" nextAc="seek">
-              <p:cTn id="2" dur="indefinite" nodeType="mainSeq">
-                <p:childTnLst>
-                  <p:par>
-                    <p:cTn id="3" fill="hold">
-                      <p:stCondLst>
-                        <p:cond delay="indefinite"/>
-                        <p:cond evt="onBegin" delay="0">
-                          <p:tn val="2"/>
-                        </p:cond>
-                      </p:stCondLst>
-                      <p:childTnLst>
-                        <p:par>
-                          <p:cTn id="4" fill="hold">
-                            <p:stCondLst>
-                              <p:cond delay="0"/>
-                            </p:stCondLst>
-                            <p:childTnLst>
-                              <p:par>
-                                <p:cTn id="5" presetID="2" presetClass="entr" presetSubtype="4" fill="hold" nodeType="withEffect">
-                                  <p:stCondLst>
-                                    <p:cond delay="0"/>
-                                  </p:stCondLst>
-                                  <p:childTnLst>
-                                    <p:set>
-                                      <p:cBhvr>
-                                        <p:cTn id="6" dur="1" fill="hold">
-                                          <p:stCondLst>
-                                            <p:cond delay="0"/>
-                                          </p:stCondLst>
-                                        </p:cTn>
-                                        <p:tgtEl>
-                                          <p:spTgt spid="5"/>
-                                        </p:tgtEl>
-                                        <p:attrNameLst>
-                                          <p:attrName>style.visibility</p:attrName>
-                                        </p:attrNameLst>
-                                      </p:cBhvr>
-                                      <p:to>
-                                        <p:strVal val="visible"/>
-                                      </p:to>
-                                    </p:set>
-                                    <p:anim calcmode="lin" valueType="num">
-                                      <p:cBhvr additive="base">
-                                        <p:cTn id="7" dur="500" fill="hold"/>
-                                        <p:tgtEl>
-                                          <p:spTgt spid="5"/>
-                                        </p:tgtEl>
-                                        <p:attrNameLst>
-                                          <p:attrName>ppt_x</p:attrName>
-                                        </p:attrNameLst>
-                                      </p:cBhvr>
-                                      <p:tavLst>
-                                        <p:tav tm="0">
-                                          <p:val>
-                                            <p:strVal val="#ppt_x"/>
-                                          </p:val>
-                                        </p:tav>
-                                        <p:tav tm="100000">
-                                          <p:val>
-                                            <p:strVal val="#ppt_x"/>
-                                          </p:val>
-                                        </p:tav>
-                                      </p:tavLst>
-                                    </p:anim>
-                                    <p:anim calcmode="lin" valueType="num">
-                                      <p:cBhvr additive="base">
-                                        <p:cTn id="8" dur="500" fill="hold"/>
-                                        <p:tgtEl>
-                                          <p:spTgt spid="5"/>
-                                        </p:tgtEl>
-                                        <p:attrNameLst>
-                                          <p:attrName>ppt_y</p:attrName>
-                                        </p:attrNameLst>
-                                      </p:cBhvr>
-                                      <p:tavLst>
-                                        <p:tav tm="0">
-                                          <p:val>
-                                            <p:strVal val="1+#ppt_h/2"/>
-                                          </p:val>
-                                        </p:tav>
-                                        <p:tav tm="100000">
-                                          <p:val>
-                                            <p:strVal val="#ppt_y"/>
-                                          </p:val>
-                                        </p:tav>
-                                      </p:tavLst>
-                                    </p:anim>
-                                  </p:childTnLst>
-                                </p:cTn>
-                              </p:par>
-                              <p:par>
-                                <p:cTn id="9" presetID="2" presetClass="exit" presetSubtype="4" fill="hold" nodeType="withEffect">
-                                  <p:stCondLst>
-                                    <p:cond delay="0"/>
-                                  </p:stCondLst>
-                                  <p:childTnLst>
-                                    <p:anim calcmode="lin" valueType="num">
-                                      <p:cBhvr additive="base">
-                                        <p:cTn id="10" dur="500"/>
-                                        <p:tgtEl>
-                                          <p:spTgt spid="5"/>
-                                        </p:tgtEl>
-                                        <p:attrNameLst>
-                                          <p:attrName>ppt_x</p:attrName>
-                                        </p:attrNameLst>
-                                      </p:cBhvr>
-                                      <p:tavLst>
-                                        <p:tav tm="0">
-                                          <p:val>
-                                            <p:strVal val="ppt_x"/>
-                                          </p:val>
-                                        </p:tav>
-                                        <p:tav tm="100000">
-                                          <p:val>
-                                            <p:strVal val="ppt_x"/>
-                                          </p:val>
-                                        </p:tav>
-                                      </p:tavLst>
-                                    </p:anim>
-                                    <p:anim calcmode="lin" valueType="num">
-                                      <p:cBhvr additive="base">
-                                        <p:cTn id="11" dur="500"/>
-                                        <p:tgtEl>
-                                          <p:spTgt spid="5"/>
-                                        </p:tgtEl>
-                                        <p:attrNameLst>
-                                          <p:attrName>ppt_y</p:attrName>
-                                        </p:attrNameLst>
-                                      </p:cBhvr>
-                                      <p:tavLst>
-                                        <p:tav tm="0">
-                                          <p:val>
-                                            <p:strVal val="ppt_y"/>
-                                          </p:val>
-                                        </p:tav>
-                                        <p:tav tm="100000">
-                                          <p:val>
-                                            <p:strVal val="1+ppt_h/2"/>
-                                          </p:val>
-                                        </p:tav>
-                                      </p:tavLst>
-                                    </p:anim>
-                                    <p:set>
-                                      <p:cBhvr>
-                                        <p:cTn id="12" dur="1" fill="hold">
-                                          <p:stCondLst>
-                                            <p:cond delay="499"/>
-                                          </p:stCondLst>
-                                        </p:cTn>
-                                        <p:tgtEl>
-                                          <p:spTgt spid="5"/>
-                                        </p:tgtEl>
-                                        <p:attrNameLst>
-                                          <p:attrName>style.visibility</p:attrName>
-                                        </p:attrNameLst>
-                                      </p:cBhvr>
-                                      <p:to>
-                                        <p:strVal val="hidden"/>
-                                      </p:to>
-                                    </p:set>
-                                  </p:childTnLst>
-                                </p:cTn>
-                              </p:par>
-                            </p:childTnLst>
-                          </p:cTn>
-                        </p:par>
-                      </p:childTnLst>
-                    </p:cTn>
-                  </p:par>
-                </p:childTnLst>
-              </p:cTn>
-              <p:prevCondLst>
-                <p:cond evt="onPrev" delay="0">
-                  <p:tgtEl>
-                    <p:sldTgt/>
-                  </p:tgtEl>
-                </p:cond>
-              </p:prevCondLst>
-              <p:nextCondLst>
-                <p:cond evt="onNext" delay="0">
-                  <p:tgtEl>
-                    <p:sldTgt/>
-                  </p:tgtEl>
-                </p:cond>
-              </p:nextCondLst>
-            </p:seq>
-          </p:childTnLst>
-        </p:cTn>
-      </p:par>
-    </p:tnLst>
-  </p:timing>
 </p:sld>
 </file>
 
@@ -5230,7 +6582,7 @@
           <p:cNvPr id="2" name="Title 1">
             <a:extLst>
               <a:ext uri="{FF2B5EF4-FFF2-40B4-BE49-F238E27FC236}">
-                <a16:creationId xmlns:a16="http://schemas.microsoft.com/office/drawing/2014/main" id="{2D46B329-CC71-459B-A194-34FDBFB7D38B}"/>
+                <a16:creationId xmlns:a16="http://schemas.microsoft.com/office/drawing/2014/main" id="{AD5FED0D-3B76-47A5-AE6E-D626C074A8F3}"/>
               </a:ext>
             </a:extLst>
           </p:cNvPr>
@@ -5248,7 +6600,7 @@
           <a:p>
             <a:r>
               <a:rPr lang="en-US" dirty="0"/>
-              <a:t>Matrix Functions (Projection)</a:t>
+              <a:t>Matrix functions(Model)</a:t>
             </a:r>
           </a:p>
         </p:txBody>
@@ -5258,7 +6610,7 @@
           <p:cNvPr id="3" name="Content Placeholder 2">
             <a:extLst>
               <a:ext uri="{FF2B5EF4-FFF2-40B4-BE49-F238E27FC236}">
-                <a16:creationId xmlns:a16="http://schemas.microsoft.com/office/drawing/2014/main" id="{3D1A8384-2727-40CF-9350-232AEF9AE78C}"/>
+                <a16:creationId xmlns:a16="http://schemas.microsoft.com/office/drawing/2014/main" id="{D237B454-110A-4991-B112-A8F4C2B7C986}"/>
               </a:ext>
             </a:extLst>
           </p:cNvPr>
@@ -5276,7 +6628,14 @@
           <a:p>
             <a:r>
               <a:rPr lang="en-US" dirty="0" err="1"/>
-              <a:t>Matrix.frustrumM</a:t>
+              <a:t>Matrix.setIdentity</a:t>
+            </a:r>
+            <a:endParaRPr lang="en-US" dirty="0"/>
+          </a:p>
+          <a:p>
+            <a:r>
+              <a:rPr lang="en-US" dirty="0" err="1"/>
+              <a:t>Matrix.scaleM</a:t>
             </a:r>
             <a:r>
               <a:rPr lang="en-US" dirty="0"/>
@@ -5284,7 +6643,7 @@
             </a:r>
             <a:r>
               <a:rPr lang="zh-CN" altLang="en-US" dirty="0"/>
-              <a:t>透视投影</a:t>
+              <a:t>缩放</a:t>
             </a:r>
             <a:r>
               <a:rPr lang="en-US" dirty="0"/>
@@ -5292,17 +6651,25 @@
             </a:r>
           </a:p>
           <a:p>
+            <a:pPr lvl="1"/>
             <a:r>
               <a:rPr lang="en-US" dirty="0" err="1"/>
-              <a:t>Matrix.orthM</a:t>
+              <a:t>x,y,z</a:t>
+            </a:r>
+            <a:endParaRPr lang="en-US" dirty="0"/>
+          </a:p>
+          <a:p>
+            <a:r>
+              <a:rPr lang="en-US" dirty="0" err="1"/>
+              <a:t>Matrix.translateM</a:t>
             </a:r>
             <a:r>
               <a:rPr lang="en-US" dirty="0"/>
-              <a:t> (</a:t>
+              <a:t>(</a:t>
             </a:r>
             <a:r>
               <a:rPr lang="zh-CN" altLang="en-US" dirty="0"/>
-              <a:t>正交投影</a:t>
+              <a:t>平移</a:t>
             </a:r>
             <a:r>
               <a:rPr lang="en-US" dirty="0"/>
@@ -5313,8 +6680,31 @@
             <a:pPr lvl="1"/>
             <a:r>
               <a:rPr lang="en-US" dirty="0" err="1"/>
-              <a:t>Left,right,bottom,top,near,far</a:t>
-            </a:r>
+              <a:t>x,y,z</a:t>
+            </a:r>
+            <a:endParaRPr lang="en-US" dirty="0"/>
+          </a:p>
+          <a:p>
+            <a:r>
+              <a:rPr lang="en-US" dirty="0" err="1"/>
+              <a:t>Matrix.rotateM</a:t>
+            </a:r>
+            <a:r>
+              <a:rPr lang="en-US" dirty="0"/>
+              <a:t>(</a:t>
+            </a:r>
+            <a:r>
+              <a:rPr lang="zh-CN" altLang="en-US" dirty="0"/>
+              <a:t>旋转</a:t>
+            </a:r>
+            <a:r>
+              <a:rPr lang="en-US"/>
+              <a:t>) </a:t>
+            </a:r>
+            <a:endParaRPr lang="en-US" dirty="0"/>
+          </a:p>
+          <a:p>
+            <a:pPr lvl="1"/>
             <a:endParaRPr lang="en-US" dirty="0"/>
           </a:p>
         </p:txBody>
@@ -5322,7 +6712,7 @@
     </p:spTree>
     <p:extLst>
       <p:ext uri="{BB962C8B-B14F-4D97-AF65-F5344CB8AC3E}">
-        <p14:creationId xmlns:p14="http://schemas.microsoft.com/office/powerpoint/2010/main" val="1592753841"/>
+        <p14:creationId xmlns:p14="http://schemas.microsoft.com/office/powerpoint/2010/main" val="4100477375"/>
       </p:ext>
     </p:extLst>
   </p:cSld>

</xml_diff>